<commit_message>
added slides about Docker image creation and Dockerfile spec
</commit_message>
<xml_diff>
--- a/02-Container-and-Provisioning/ContainerProvisioning.pptx
+++ b/02-Container-and-Provisioning/ContainerProvisioning.pptx
@@ -5,7 +5,7 @@
     <p:sldMasterId id="2147483672" r:id="rId1"/>
   </p:sldMasterIdLst>
   <p:notesMasterIdLst>
-    <p:notesMasterId r:id="rId14"/>
+    <p:notesMasterId r:id="rId20"/>
   </p:notesMasterIdLst>
   <p:sldIdLst>
     <p:sldId id="256" r:id="rId2"/>
@@ -20,6 +20,12 @@
     <p:sldId id="267" r:id="rId11"/>
     <p:sldId id="268" r:id="rId12"/>
     <p:sldId id="269" r:id="rId13"/>
+    <p:sldId id="270" r:id="rId14"/>
+    <p:sldId id="271" r:id="rId15"/>
+    <p:sldId id="272" r:id="rId16"/>
+    <p:sldId id="273" r:id="rId17"/>
+    <p:sldId id="274" r:id="rId18"/>
+    <p:sldId id="275" r:id="rId19"/>
   </p:sldIdLst>
   <p:sldSz cx="9144000" cy="6858000" type="screen4x3"/>
   <p:notesSz cx="6858000" cy="9144000"/>
@@ -135,6 +141,12 @@
             <p14:sldId id="267"/>
             <p14:sldId id="268"/>
             <p14:sldId id="269"/>
+            <p14:sldId id="270"/>
+            <p14:sldId id="271"/>
+            <p14:sldId id="272"/>
+            <p14:sldId id="273"/>
+            <p14:sldId id="274"/>
+            <p14:sldId id="275"/>
           </p14:sldIdLst>
         </p14:section>
       </p14:sectionLst>
@@ -232,7 +244,7 @@
           <a:p>
             <a:fld id="{852105B6-D441-4EC0-9FA7-CF26CD0B8EA0}" type="datetimeFigureOut">
               <a:rPr lang="en-US" smtClean="0"/>
-              <a:t>10/9/2017</a:t>
+              <a:t>10/11/2017</a:t>
             </a:fld>
             <a:endParaRPr lang="en-US"/>
           </a:p>
@@ -498,6 +510,90 @@
     </a:lvl9pPr>
   </p:notesStyle>
 </p:notesMaster>
+</file>
+
+<file path=ppt/notesSlides/notesSlide1.xml><?xml version="1.0" encoding="utf-8"?>
+<p:notes xmlns:a="http://schemas.openxmlformats.org/drawingml/2006/main" xmlns:r="http://schemas.openxmlformats.org/officeDocument/2006/relationships" xmlns:p="http://schemas.openxmlformats.org/presentationml/2006/main">
+  <p:cSld>
+    <p:spTree>
+      <p:nvGrpSpPr>
+        <p:cNvPr id="1" name=""/>
+        <p:cNvGrpSpPr/>
+        <p:nvPr/>
+      </p:nvGrpSpPr>
+      <p:grpSpPr>
+        <a:xfrm>
+          <a:off x="0" y="0"/>
+          <a:ext cx="0" cy="0"/>
+          <a:chOff x="0" y="0"/>
+          <a:chExt cx="0" cy="0"/>
+        </a:xfrm>
+      </p:grpSpPr>
+      <p:sp>
+        <p:nvSpPr>
+          <p:cNvPr id="2" name="Folienbildplatzhalter 1"/>
+          <p:cNvSpPr>
+            <a:spLocks noGrp="1" noRot="1" noChangeAspect="1"/>
+          </p:cNvSpPr>
+          <p:nvPr>
+            <p:ph type="sldImg"/>
+          </p:nvPr>
+        </p:nvSpPr>
+        <p:spPr/>
+      </p:sp>
+      <p:sp>
+        <p:nvSpPr>
+          <p:cNvPr id="3" name="Notizenplatzhalter 2"/>
+          <p:cNvSpPr>
+            <a:spLocks noGrp="1"/>
+          </p:cNvSpPr>
+          <p:nvPr>
+            <p:ph type="body" idx="1"/>
+          </p:nvPr>
+        </p:nvSpPr>
+        <p:spPr/>
+        <p:txBody>
+          <a:bodyPr/>
+          <a:lstStyle/>
+          <a:p>
+            <a:endParaRPr lang="en-US" dirty="0"/>
+          </a:p>
+        </p:txBody>
+      </p:sp>
+      <p:sp>
+        <p:nvSpPr>
+          <p:cNvPr id="4" name="Foliennummernplatzhalter 3"/>
+          <p:cNvSpPr>
+            <a:spLocks noGrp="1"/>
+          </p:cNvSpPr>
+          <p:nvPr>
+            <p:ph type="sldNum" sz="quarter" idx="10"/>
+          </p:nvPr>
+        </p:nvSpPr>
+        <p:spPr/>
+        <p:txBody>
+          <a:bodyPr/>
+          <a:lstStyle/>
+          <a:p>
+            <a:fld id="{4B9E1626-1954-45D8-AE63-23C3FFC9B491}" type="slidenum">
+              <a:rPr lang="en-US" smtClean="0"/>
+              <a:t>16</a:t>
+            </a:fld>
+            <a:endParaRPr lang="en-US"/>
+          </a:p>
+        </p:txBody>
+      </p:sp>
+    </p:spTree>
+    <p:extLst>
+      <p:ext uri="{BB962C8B-B14F-4D97-AF65-F5344CB8AC3E}">
+        <p14:creationId xmlns:p14="http://schemas.microsoft.com/office/powerpoint/2010/main" val="3989022408"/>
+      </p:ext>
+    </p:extLst>
+  </p:cSld>
+  <p:clrMapOvr>
+    <a:masterClrMapping/>
+  </p:clrMapOvr>
+</p:notes>
 </file>
 
 <file path=ppt/slideLayouts/slideLayout1.xml><?xml version="1.0" encoding="utf-8"?>
@@ -2873,7 +2969,7 @@
             <p:ph idx="1"/>
             <p:extLst>
               <p:ext uri="{D42A27DB-BD31-4B8C-83A1-F6EECF244321}">
-                <p14:modId xmlns:p14="http://schemas.microsoft.com/office/powerpoint/2010/main" val="3735258105"/>
+                <p14:modId xmlns:p14="http://schemas.microsoft.com/office/powerpoint/2010/main" val="933803626"/>
               </p:ext>
             </p:extLst>
           </p:nvPr>
@@ -3115,7 +3211,7 @@
                       </a:r>
                       <a:r>
                         <a:rPr lang="en-US" dirty="0"/>
-                        <a:t>[image[:version]]</a:t>
+                        <a:t>&lt;image[:version]&gt;</a:t>
                       </a:r>
                     </a:p>
                   </a:txBody>
@@ -3185,7 +3281,7 @@
                       </a:r>
                       <a:r>
                         <a:rPr lang="en-US" dirty="0"/>
-                        <a:t>–d [image[:version]]</a:t>
+                        <a:t>–d &lt;image[:version]&gt;</a:t>
                       </a:r>
                     </a:p>
                   </a:txBody>
@@ -3234,7 +3330,7 @@
                       </a:r>
                       <a:r>
                         <a:rPr lang="en-US" dirty="0"/>
-                        <a:t> [container id/name]</a:t>
+                        <a:t> &lt;container id/name&gt;</a:t>
                       </a:r>
                     </a:p>
                   </a:txBody>
@@ -3275,7 +3371,7 @@
                       </a:r>
                       <a:r>
                         <a:rPr lang="en-US" dirty="0"/>
-                        <a:t> –f [container id/name]</a:t>
+                        <a:t> –f &lt;container id/name&gt;</a:t>
                       </a:r>
                     </a:p>
                   </a:txBody>
@@ -3316,7 +3412,7 @@
                       </a:r>
                       <a:r>
                         <a:rPr lang="en-US" dirty="0"/>
-                        <a:t> [container id/name] /bin/bash</a:t>
+                        <a:t> &lt;container id/name&gt; /bin/bash</a:t>
                       </a:r>
                     </a:p>
                   </a:txBody>
@@ -3419,14 +3515,14 @@
             <p:ph idx="1"/>
             <p:extLst>
               <p:ext uri="{D42A27DB-BD31-4B8C-83A1-F6EECF244321}">
-                <p14:modId xmlns:p14="http://schemas.microsoft.com/office/powerpoint/2010/main" val="3154912183"/>
+                <p14:modId xmlns:p14="http://schemas.microsoft.com/office/powerpoint/2010/main" val="1025426842"/>
               </p:ext>
             </p:extLst>
           </p:nvPr>
         </p:nvGraphicFramePr>
         <p:xfrm>
           <a:off x="258763" y="1403350"/>
-          <a:ext cx="8697912" cy="1112520"/>
+          <a:ext cx="8697912" cy="1710563"/>
         </p:xfrm>
         <a:graphic>
           <a:graphicData uri="http://schemas.openxmlformats.org/drawingml/2006/table">
@@ -3517,7 +3613,7 @@
                       </a:r>
                       <a:r>
                         <a:rPr lang="en-US" dirty="0"/>
-                        <a:t> [image id]</a:t>
+                        <a:t> &lt;image id&gt;</a:t>
                       </a:r>
                     </a:p>
                   </a:txBody>
@@ -3584,7 +3680,7 @@
                       </a:pPr>
                       <a:r>
                         <a:rPr lang="en-US" dirty="0"/>
-                        <a:t>docker stop [container id/name]</a:t>
+                        <a:t>docker stop &lt;container id/name&gt;</a:t>
                       </a:r>
                     </a:p>
                   </a:txBody>
@@ -3623,6 +3719,70 @@
                 <a:extLst>
                   <a:ext uri="{0D108BD9-81ED-4DB2-BD59-A6C34878D82A}">
                     <a16:rowId xmlns:a16="http://schemas.microsoft.com/office/drawing/2014/main" val="3336913469"/>
+                  </a:ext>
+                </a:extLst>
+              </a:tr>
+              <a:tr h="370840">
+                <a:tc>
+                  <a:txBody>
+                    <a:bodyPr/>
+                    <a:lstStyle/>
+                    <a:p>
+                      <a:pPr marL="0" marR="0" lvl="0" indent="0" algn="l" defTabSz="844083" rtl="0" eaLnBrk="1" fontAlgn="auto" latinLnBrk="0" hangingPunct="1">
+                        <a:lnSpc>
+                          <a:spcPct val="100000"/>
+                        </a:lnSpc>
+                        <a:spcBef>
+                          <a:spcPts val="0"/>
+                        </a:spcBef>
+                        <a:spcAft>
+                          <a:spcPts val="0"/>
+                        </a:spcAft>
+                        <a:buClrTx/>
+                        <a:buSzTx/>
+                        <a:buFontTx/>
+                        <a:buNone/>
+                        <a:tabLst/>
+                        <a:defRPr/>
+                      </a:pPr>
+                      <a:r>
+                        <a:rPr lang="en-US" dirty="0"/>
+                        <a:t>docker commit &lt;container id/name&gt; [repository[:tag]]</a:t>
+                      </a:r>
+                    </a:p>
+                  </a:txBody>
+                  <a:tcPr/>
+                </a:tc>
+                <a:tc>
+                  <a:txBody>
+                    <a:bodyPr/>
+                    <a:lstStyle/>
+                    <a:p>
+                      <a:pPr marL="0" marR="0" lvl="0" indent="0" algn="l" defTabSz="844083" rtl="0" eaLnBrk="1" fontAlgn="auto" latinLnBrk="0" hangingPunct="1">
+                        <a:lnSpc>
+                          <a:spcPct val="100000"/>
+                        </a:lnSpc>
+                        <a:spcBef>
+                          <a:spcPts val="0"/>
+                        </a:spcBef>
+                        <a:spcAft>
+                          <a:spcPts val="0"/>
+                        </a:spcAft>
+                        <a:buClrTx/>
+                        <a:buSzTx/>
+                        <a:buFontTx/>
+                        <a:buNone/>
+                        <a:tabLst/>
+                        <a:defRPr/>
+                      </a:pPr>
+                      <a:endParaRPr lang="en-US" dirty="0"/>
+                    </a:p>
+                  </a:txBody>
+                  <a:tcPr/>
+                </a:tc>
+                <a:extLst>
+                  <a:ext uri="{0D108BD9-81ED-4DB2-BD59-A6C34878D82A}">
+                    <a16:rowId xmlns:a16="http://schemas.microsoft.com/office/drawing/2014/main" val="2328551764"/>
                   </a:ext>
                 </a:extLst>
               </a:tr>
@@ -3946,6 +4106,2028 @@
     <p:extLst>
       <p:ext uri="{BB962C8B-B14F-4D97-AF65-F5344CB8AC3E}">
         <p14:creationId xmlns:p14="http://schemas.microsoft.com/office/powerpoint/2010/main" val="4225478545"/>
+      </p:ext>
+    </p:extLst>
+  </p:cSld>
+  <p:clrMapOvr>
+    <a:masterClrMapping/>
+  </p:clrMapOvr>
+</p:sld>
+</file>
+
+<file path=ppt/slides/slide13.xml><?xml version="1.0" encoding="utf-8"?>
+<p:sld xmlns:a="http://schemas.openxmlformats.org/drawingml/2006/main" xmlns:r="http://schemas.openxmlformats.org/officeDocument/2006/relationships" xmlns:p="http://schemas.openxmlformats.org/presentationml/2006/main">
+  <p:cSld>
+    <p:spTree>
+      <p:nvGrpSpPr>
+        <p:cNvPr id="1" name=""/>
+        <p:cNvGrpSpPr/>
+        <p:nvPr/>
+      </p:nvGrpSpPr>
+      <p:grpSpPr>
+        <a:xfrm>
+          <a:off x="0" y="0"/>
+          <a:ext cx="0" cy="0"/>
+          <a:chOff x="0" y="0"/>
+          <a:chExt cx="0" cy="0"/>
+        </a:xfrm>
+      </p:grpSpPr>
+      <p:sp>
+        <p:nvSpPr>
+          <p:cNvPr id="4" name="Titel 3">
+            <a:extLst>
+              <a:ext uri="{FF2B5EF4-FFF2-40B4-BE49-F238E27FC236}">
+                <a16:creationId xmlns:a16="http://schemas.microsoft.com/office/drawing/2014/main" id="{9BF3329D-1CB1-41D7-ADDE-53FF93315E41}"/>
+              </a:ext>
+            </a:extLst>
+          </p:cNvPr>
+          <p:cNvSpPr>
+            <a:spLocks noGrp="1"/>
+          </p:cNvSpPr>
+          <p:nvPr>
+            <p:ph type="title"/>
+          </p:nvPr>
+        </p:nvSpPr>
+        <p:spPr/>
+        <p:txBody>
+          <a:bodyPr/>
+          <a:lstStyle/>
+          <a:p>
+            <a:r>
+              <a:rPr lang="en-US" dirty="0"/>
+              <a:t>Docker Images</a:t>
+            </a:r>
+          </a:p>
+        </p:txBody>
+      </p:sp>
+      <p:pic>
+        <p:nvPicPr>
+          <p:cNvPr id="1026" name="Picture 2" descr="Docker image layers">
+            <a:extLst>
+              <a:ext uri="{FF2B5EF4-FFF2-40B4-BE49-F238E27FC236}">
+                <a16:creationId xmlns:a16="http://schemas.microsoft.com/office/drawing/2014/main" id="{B2852923-B09A-464B-96AB-25FD1C8A41F9}"/>
+              </a:ext>
+            </a:extLst>
+          </p:cNvPr>
+          <p:cNvPicPr>
+            <a:picLocks noGrp="1" noChangeAspect="1" noChangeArrowheads="1"/>
+          </p:cNvPicPr>
+          <p:nvPr>
+            <p:ph idx="1"/>
+          </p:nvPr>
+        </p:nvPicPr>
+        <p:blipFill>
+          <a:blip r:embed="rId2">
+            <a:extLst>
+              <a:ext uri="{28A0092B-C50C-407E-A947-70E740481C1C}">
+                <a14:useLocalDpi xmlns:a14="http://schemas.microsoft.com/office/drawing/2010/main" val="0"/>
+              </a:ext>
+            </a:extLst>
+          </a:blip>
+          <a:srcRect/>
+          <a:stretch>
+            <a:fillRect/>
+          </a:stretch>
+        </p:blipFill>
+        <p:spPr bwMode="auto">
+          <a:xfrm>
+            <a:off x="2022612" y="1866724"/>
+            <a:ext cx="5170213" cy="3592341"/>
+          </a:xfrm>
+          <a:prstGeom prst="rect">
+            <a:avLst/>
+          </a:prstGeom>
+          <a:noFill/>
+          <a:extLst>
+            <a:ext uri="{909E8E84-426E-40DD-AFC4-6F175D3DCCD1}">
+              <a14:hiddenFill xmlns:a14="http://schemas.microsoft.com/office/drawing/2010/main">
+                <a:solidFill>
+                  <a:srgbClr val="FFFFFF"/>
+                </a:solidFill>
+              </a14:hiddenFill>
+            </a:ext>
+          </a:extLst>
+        </p:spPr>
+      </p:pic>
+      <p:sp>
+        <p:nvSpPr>
+          <p:cNvPr id="6" name="Textfeld 5">
+            <a:extLst>
+              <a:ext uri="{FF2B5EF4-FFF2-40B4-BE49-F238E27FC236}">
+                <a16:creationId xmlns:a16="http://schemas.microsoft.com/office/drawing/2014/main" id="{D40D7E79-0A9A-4516-80B2-6FB72812EF94}"/>
+              </a:ext>
+            </a:extLst>
+          </p:cNvPr>
+          <p:cNvSpPr txBox="1"/>
+          <p:nvPr/>
+        </p:nvSpPr>
+        <p:spPr>
+          <a:xfrm>
+            <a:off x="259374" y="6163986"/>
+            <a:ext cx="8509313" cy="276999"/>
+          </a:xfrm>
+          <a:prstGeom prst="rect">
+            <a:avLst/>
+          </a:prstGeom>
+          <a:noFill/>
+        </p:spPr>
+        <p:txBody>
+          <a:bodyPr wrap="square" rtlCol="0">
+            <a:spAutoFit/>
+          </a:bodyPr>
+          <a:lstStyle/>
+          <a:p>
+            <a:r>
+              <a:rPr lang="en-US" sz="1200" dirty="0">
+                <a:hlinkClick r:id="rId3"/>
+              </a:rPr>
+              <a:t>Quelle</a:t>
+            </a:r>
+            <a:endParaRPr lang="en-US" sz="1200" dirty="0"/>
+          </a:p>
+        </p:txBody>
+      </p:sp>
+    </p:spTree>
+    <p:extLst>
+      <p:ext uri="{BB962C8B-B14F-4D97-AF65-F5344CB8AC3E}">
+        <p14:creationId xmlns:p14="http://schemas.microsoft.com/office/powerpoint/2010/main" val="2527376198"/>
+      </p:ext>
+    </p:extLst>
+  </p:cSld>
+  <p:clrMapOvr>
+    <a:masterClrMapping/>
+  </p:clrMapOvr>
+</p:sld>
+</file>
+
+<file path=ppt/slides/slide14.xml><?xml version="1.0" encoding="utf-8"?>
+<p:sld xmlns:a="http://schemas.openxmlformats.org/drawingml/2006/main" xmlns:r="http://schemas.openxmlformats.org/officeDocument/2006/relationships" xmlns:p="http://schemas.openxmlformats.org/presentationml/2006/main">
+  <p:cSld>
+    <p:spTree>
+      <p:nvGrpSpPr>
+        <p:cNvPr id="1" name=""/>
+        <p:cNvGrpSpPr/>
+        <p:nvPr/>
+      </p:nvGrpSpPr>
+      <p:grpSpPr>
+        <a:xfrm>
+          <a:off x="0" y="0"/>
+          <a:ext cx="0" cy="0"/>
+          <a:chOff x="0" y="0"/>
+          <a:chExt cx="0" cy="0"/>
+        </a:xfrm>
+      </p:grpSpPr>
+      <p:sp>
+        <p:nvSpPr>
+          <p:cNvPr id="4" name="Titel 3">
+            <a:extLst>
+              <a:ext uri="{FF2B5EF4-FFF2-40B4-BE49-F238E27FC236}">
+                <a16:creationId xmlns:a16="http://schemas.microsoft.com/office/drawing/2014/main" id="{638046A4-1B43-448F-9F0F-9DCE87108411}"/>
+              </a:ext>
+            </a:extLst>
+          </p:cNvPr>
+          <p:cNvSpPr>
+            <a:spLocks noGrp="1"/>
+          </p:cNvSpPr>
+          <p:nvPr>
+            <p:ph type="title"/>
+          </p:nvPr>
+        </p:nvSpPr>
+        <p:spPr/>
+        <p:txBody>
+          <a:bodyPr/>
+          <a:lstStyle/>
+          <a:p>
+            <a:r>
+              <a:rPr lang="de-DE" dirty="0"/>
+              <a:t>Docker Images</a:t>
+            </a:r>
+            <a:endParaRPr lang="en-US" dirty="0"/>
+          </a:p>
+        </p:txBody>
+      </p:sp>
+      <p:sp>
+        <p:nvSpPr>
+          <p:cNvPr id="5" name="Inhaltsplatzhalter 4">
+            <a:extLst>
+              <a:ext uri="{FF2B5EF4-FFF2-40B4-BE49-F238E27FC236}">
+                <a16:creationId xmlns:a16="http://schemas.microsoft.com/office/drawing/2014/main" id="{93CAB46B-52A8-4BB4-AE52-F1EDDAEF3A5F}"/>
+              </a:ext>
+            </a:extLst>
+          </p:cNvPr>
+          <p:cNvSpPr>
+            <a:spLocks noGrp="1"/>
+          </p:cNvSpPr>
+          <p:nvPr>
+            <p:ph idx="1"/>
+          </p:nvPr>
+        </p:nvSpPr>
+        <p:spPr/>
+        <p:txBody>
+          <a:bodyPr/>
+          <a:lstStyle/>
+          <a:p>
+            <a:r>
+              <a:rPr lang="de-DE" dirty="0"/>
+              <a:t>Images </a:t>
+            </a:r>
+            <a:r>
+              <a:rPr lang="de-DE" dirty="0" err="1"/>
+              <a:t>consist</a:t>
+            </a:r>
+            <a:r>
+              <a:rPr lang="de-DE" dirty="0"/>
+              <a:t> </a:t>
+            </a:r>
+            <a:r>
+              <a:rPr lang="de-DE" dirty="0" err="1"/>
+              <a:t>of</a:t>
+            </a:r>
+            <a:r>
+              <a:rPr lang="de-DE" dirty="0"/>
+              <a:t> </a:t>
+            </a:r>
+            <a:r>
+              <a:rPr lang="en-US" dirty="0"/>
+              <a:t>(more or less) layers</a:t>
+            </a:r>
+            <a:endParaRPr lang="de-DE" dirty="0"/>
+          </a:p>
+          <a:p>
+            <a:r>
+              <a:rPr lang="de-DE" dirty="0"/>
+              <a:t>Every </a:t>
+            </a:r>
+            <a:r>
+              <a:rPr lang="de-DE" dirty="0" err="1"/>
+              <a:t>layer</a:t>
+            </a:r>
+            <a:r>
+              <a:rPr lang="de-DE" dirty="0"/>
+              <a:t> </a:t>
+            </a:r>
+            <a:r>
+              <a:rPr lang="de-DE" dirty="0" err="1"/>
+              <a:t>is</a:t>
+            </a:r>
+            <a:r>
+              <a:rPr lang="de-DE" dirty="0"/>
+              <a:t> a </a:t>
+            </a:r>
+            <a:r>
+              <a:rPr lang="de-DE" dirty="0" err="1"/>
+              <a:t>kind</a:t>
+            </a:r>
+            <a:r>
+              <a:rPr lang="de-DE" dirty="0"/>
+              <a:t> </a:t>
+            </a:r>
+            <a:r>
+              <a:rPr lang="de-DE" dirty="0" err="1"/>
+              <a:t>of</a:t>
+            </a:r>
+            <a:r>
+              <a:rPr lang="de-DE" dirty="0"/>
+              <a:t> a </a:t>
+            </a:r>
+            <a:r>
+              <a:rPr lang="de-DE" dirty="0" err="1"/>
+              <a:t>snapshot</a:t>
+            </a:r>
+            <a:r>
+              <a:rPr lang="de-DE" dirty="0"/>
+              <a:t> and </a:t>
+            </a:r>
+            <a:r>
+              <a:rPr lang="de-DE" dirty="0" err="1"/>
+              <a:t>can</a:t>
+            </a:r>
+            <a:r>
+              <a:rPr lang="de-DE" dirty="0"/>
+              <a:t> </a:t>
+            </a:r>
+            <a:r>
+              <a:rPr lang="de-DE" dirty="0" err="1"/>
+              <a:t>be</a:t>
+            </a:r>
+            <a:r>
+              <a:rPr lang="de-DE" dirty="0"/>
+              <a:t> </a:t>
+            </a:r>
+            <a:r>
+              <a:rPr lang="de-DE" dirty="0" err="1"/>
+              <a:t>removed</a:t>
+            </a:r>
+            <a:endParaRPr lang="en-US" dirty="0"/>
+          </a:p>
+          <a:p>
+            <a:r>
+              <a:rPr lang="de-DE" dirty="0" err="1"/>
+              <a:t>It</a:t>
+            </a:r>
+            <a:r>
+              <a:rPr lang="en-US" dirty="0"/>
+              <a:t>’s possible to inspect how a specific layer was created (more on that later)</a:t>
+            </a:r>
+          </a:p>
+          <a:p>
+            <a:r>
+              <a:rPr lang="en-US" dirty="0"/>
+              <a:t>At last each layer isn’t more than a .tar.gz archive which will be applied to the base image when a container is created</a:t>
+            </a:r>
+          </a:p>
+          <a:p>
+            <a:r>
+              <a:rPr lang="en-US" dirty="0"/>
+              <a:t>If a image has to be rebuilt, </a:t>
+            </a:r>
+            <a:r>
+              <a:rPr lang="de-DE" dirty="0"/>
+              <a:t>Docker </a:t>
+            </a:r>
+            <a:r>
+              <a:rPr lang="de-DE" dirty="0" err="1"/>
+              <a:t>recognizes</a:t>
+            </a:r>
+            <a:r>
+              <a:rPr lang="de-DE" dirty="0"/>
+              <a:t> </a:t>
+            </a:r>
+            <a:r>
+              <a:rPr lang="de-DE" dirty="0" err="1"/>
+              <a:t>which</a:t>
+            </a:r>
+            <a:r>
+              <a:rPr lang="de-DE" dirty="0"/>
+              <a:t> </a:t>
+            </a:r>
+            <a:r>
+              <a:rPr lang="de-DE" dirty="0" err="1"/>
+              <a:t>layers</a:t>
+            </a:r>
+            <a:r>
+              <a:rPr lang="de-DE" dirty="0"/>
+              <a:t> </a:t>
+            </a:r>
+            <a:r>
+              <a:rPr lang="de-DE" dirty="0" err="1"/>
+              <a:t>aren‘t</a:t>
+            </a:r>
+            <a:r>
+              <a:rPr lang="de-DE" dirty="0"/>
+              <a:t> </a:t>
+            </a:r>
+            <a:r>
+              <a:rPr lang="de-DE" dirty="0" err="1"/>
+              <a:t>affected</a:t>
+            </a:r>
+            <a:r>
+              <a:rPr lang="de-DE" dirty="0"/>
+              <a:t> and </a:t>
+            </a:r>
+            <a:r>
+              <a:rPr lang="de-DE" dirty="0" err="1"/>
+              <a:t>is</a:t>
+            </a:r>
+            <a:r>
+              <a:rPr lang="de-DE" dirty="0"/>
+              <a:t> </a:t>
+            </a:r>
+            <a:r>
+              <a:rPr lang="de-DE" dirty="0" err="1"/>
+              <a:t>keeping</a:t>
+            </a:r>
+            <a:r>
+              <a:rPr lang="de-DE" dirty="0"/>
+              <a:t> </a:t>
+            </a:r>
+            <a:r>
+              <a:rPr lang="de-DE" dirty="0" err="1"/>
+              <a:t>them</a:t>
+            </a:r>
+            <a:r>
+              <a:rPr lang="de-DE" dirty="0"/>
+              <a:t> </a:t>
+            </a:r>
+            <a:r>
+              <a:rPr lang="de-DE" dirty="0" err="1"/>
+              <a:t>as</a:t>
+            </a:r>
+            <a:r>
+              <a:rPr lang="de-DE" dirty="0"/>
+              <a:t> </a:t>
+            </a:r>
+            <a:r>
+              <a:rPr lang="de-DE" dirty="0" err="1"/>
+              <a:t>they</a:t>
+            </a:r>
+            <a:r>
+              <a:rPr lang="de-DE" dirty="0"/>
+              <a:t> </a:t>
+            </a:r>
+            <a:r>
+              <a:rPr lang="de-DE" dirty="0" err="1"/>
+              <a:t>are</a:t>
+            </a:r>
+            <a:r>
+              <a:rPr lang="de-DE" dirty="0"/>
+              <a:t> </a:t>
+            </a:r>
+            <a:r>
+              <a:rPr lang="de-DE" dirty="0" err="1"/>
+              <a:t>to</a:t>
+            </a:r>
+            <a:r>
+              <a:rPr lang="de-DE" dirty="0"/>
+              <a:t> </a:t>
+            </a:r>
+            <a:r>
+              <a:rPr lang="de-DE" dirty="0" err="1"/>
+              <a:t>speed</a:t>
+            </a:r>
+            <a:r>
+              <a:rPr lang="de-DE" dirty="0"/>
+              <a:t> </a:t>
+            </a:r>
+            <a:r>
+              <a:rPr lang="de-DE" dirty="0" err="1"/>
+              <a:t>up</a:t>
+            </a:r>
+            <a:r>
+              <a:rPr lang="de-DE" dirty="0"/>
+              <a:t> </a:t>
+            </a:r>
+            <a:r>
+              <a:rPr lang="de-DE" dirty="0" err="1"/>
+              <a:t>the</a:t>
+            </a:r>
+            <a:r>
+              <a:rPr lang="de-DE" dirty="0"/>
+              <a:t> </a:t>
+            </a:r>
+            <a:r>
+              <a:rPr lang="de-DE" dirty="0" err="1"/>
+              <a:t>build</a:t>
+            </a:r>
+            <a:r>
+              <a:rPr lang="de-DE" dirty="0"/>
+              <a:t> </a:t>
+            </a:r>
+            <a:r>
+              <a:rPr lang="de-DE" dirty="0" err="1"/>
+              <a:t>process</a:t>
+            </a:r>
+            <a:endParaRPr lang="de-DE" dirty="0"/>
+          </a:p>
+        </p:txBody>
+      </p:sp>
+    </p:spTree>
+    <p:extLst>
+      <p:ext uri="{BB962C8B-B14F-4D97-AF65-F5344CB8AC3E}">
+        <p14:creationId xmlns:p14="http://schemas.microsoft.com/office/powerpoint/2010/main" val="4064097092"/>
+      </p:ext>
+    </p:extLst>
+  </p:cSld>
+  <p:clrMapOvr>
+    <a:masterClrMapping/>
+  </p:clrMapOvr>
+</p:sld>
+</file>
+
+<file path=ppt/slides/slide15.xml><?xml version="1.0" encoding="utf-8"?>
+<p:sld xmlns:a="http://schemas.openxmlformats.org/drawingml/2006/main" xmlns:r="http://schemas.openxmlformats.org/officeDocument/2006/relationships" xmlns:p="http://schemas.openxmlformats.org/presentationml/2006/main">
+  <p:cSld>
+    <p:spTree>
+      <p:nvGrpSpPr>
+        <p:cNvPr id="1" name=""/>
+        <p:cNvGrpSpPr/>
+        <p:nvPr/>
+      </p:nvGrpSpPr>
+      <p:grpSpPr>
+        <a:xfrm>
+          <a:off x="0" y="0"/>
+          <a:ext cx="0" cy="0"/>
+          <a:chOff x="0" y="0"/>
+          <a:chExt cx="0" cy="0"/>
+        </a:xfrm>
+      </p:grpSpPr>
+      <p:sp>
+        <p:nvSpPr>
+          <p:cNvPr id="4" name="Titel 3">
+            <a:extLst>
+              <a:ext uri="{FF2B5EF4-FFF2-40B4-BE49-F238E27FC236}">
+                <a16:creationId xmlns:a16="http://schemas.microsoft.com/office/drawing/2014/main" id="{6FB3585B-9B35-4B36-B218-31A60126C03D}"/>
+              </a:ext>
+            </a:extLst>
+          </p:cNvPr>
+          <p:cNvSpPr>
+            <a:spLocks noGrp="1"/>
+          </p:cNvSpPr>
+          <p:nvPr>
+            <p:ph type="title"/>
+          </p:nvPr>
+        </p:nvSpPr>
+        <p:spPr/>
+        <p:txBody>
+          <a:bodyPr/>
+          <a:lstStyle/>
+          <a:p>
+            <a:r>
+              <a:rPr lang="de-DE" dirty="0" err="1"/>
+              <a:t>Creating</a:t>
+            </a:r>
+            <a:r>
+              <a:rPr lang="de-DE" dirty="0"/>
+              <a:t> </a:t>
+            </a:r>
+            <a:r>
+              <a:rPr lang="de-DE" dirty="0" err="1"/>
+              <a:t>new</a:t>
+            </a:r>
+            <a:r>
+              <a:rPr lang="de-DE" dirty="0"/>
+              <a:t> Docker </a:t>
+            </a:r>
+            <a:r>
+              <a:rPr lang="de-DE" dirty="0" err="1"/>
+              <a:t>images</a:t>
+            </a:r>
+            <a:endParaRPr lang="en-US" dirty="0"/>
+          </a:p>
+        </p:txBody>
+      </p:sp>
+      <p:sp>
+        <p:nvSpPr>
+          <p:cNvPr id="5" name="Inhaltsplatzhalter 4">
+            <a:extLst>
+              <a:ext uri="{FF2B5EF4-FFF2-40B4-BE49-F238E27FC236}">
+                <a16:creationId xmlns:a16="http://schemas.microsoft.com/office/drawing/2014/main" id="{722137B7-DBFA-4C69-BB2C-9EC558A0AC5B}"/>
+              </a:ext>
+            </a:extLst>
+          </p:cNvPr>
+          <p:cNvSpPr>
+            <a:spLocks noGrp="1"/>
+          </p:cNvSpPr>
+          <p:nvPr>
+            <p:ph idx="1"/>
+          </p:nvPr>
+        </p:nvSpPr>
+        <p:spPr/>
+        <p:txBody>
+          <a:bodyPr/>
+          <a:lstStyle/>
+          <a:p>
+            <a:r>
+              <a:rPr lang="de-DE" dirty="0" err="1"/>
+              <a:t>There</a:t>
+            </a:r>
+            <a:r>
+              <a:rPr lang="de-DE" dirty="0"/>
+              <a:t> </a:t>
+            </a:r>
+            <a:r>
+              <a:rPr lang="de-DE" dirty="0" err="1"/>
+              <a:t>are</a:t>
+            </a:r>
+            <a:r>
+              <a:rPr lang="de-DE" dirty="0"/>
+              <a:t> </a:t>
+            </a:r>
+            <a:r>
+              <a:rPr lang="de-DE" dirty="0" err="1"/>
+              <a:t>two</a:t>
+            </a:r>
+            <a:r>
+              <a:rPr lang="de-DE" dirty="0"/>
+              <a:t> </a:t>
+            </a:r>
+            <a:r>
+              <a:rPr lang="de-DE" dirty="0" err="1"/>
+              <a:t>ways</a:t>
+            </a:r>
+            <a:r>
+              <a:rPr lang="de-DE" dirty="0"/>
+              <a:t> </a:t>
+            </a:r>
+            <a:r>
+              <a:rPr lang="de-DE" dirty="0" err="1"/>
+              <a:t>to</a:t>
+            </a:r>
+            <a:r>
+              <a:rPr lang="de-DE" dirty="0"/>
+              <a:t> </a:t>
+            </a:r>
+            <a:r>
+              <a:rPr lang="de-DE" dirty="0" err="1"/>
+              <a:t>create</a:t>
+            </a:r>
+            <a:r>
+              <a:rPr lang="de-DE" dirty="0"/>
+              <a:t> </a:t>
+            </a:r>
+            <a:r>
+              <a:rPr lang="de-DE" dirty="0" err="1"/>
+              <a:t>new</a:t>
+            </a:r>
+            <a:r>
+              <a:rPr lang="de-DE" dirty="0"/>
+              <a:t> Docker </a:t>
+            </a:r>
+            <a:r>
+              <a:rPr lang="de-DE" dirty="0" err="1"/>
+              <a:t>images</a:t>
+            </a:r>
+            <a:r>
+              <a:rPr lang="de-DE" dirty="0"/>
+              <a:t>:</a:t>
+            </a:r>
+          </a:p>
+          <a:p>
+            <a:pPr lvl="1"/>
+            <a:r>
+              <a:rPr lang="de-DE" dirty="0"/>
+              <a:t>Create a </a:t>
+            </a:r>
+            <a:r>
+              <a:rPr lang="de-DE" dirty="0" err="1"/>
+              <a:t>new</a:t>
+            </a:r>
+            <a:r>
+              <a:rPr lang="de-DE" dirty="0"/>
+              <a:t> </a:t>
+            </a:r>
+            <a:r>
+              <a:rPr lang="de-DE" dirty="0" err="1"/>
+              <a:t>container</a:t>
+            </a:r>
+            <a:r>
+              <a:rPr lang="de-DE" dirty="0"/>
+              <a:t>, do all </a:t>
+            </a:r>
+            <a:r>
+              <a:rPr lang="de-DE" dirty="0" err="1"/>
+              <a:t>required</a:t>
+            </a:r>
+            <a:r>
+              <a:rPr lang="de-DE" dirty="0"/>
+              <a:t> </a:t>
+            </a:r>
+            <a:r>
+              <a:rPr lang="de-DE" dirty="0" err="1"/>
+              <a:t>changes</a:t>
+            </a:r>
+            <a:r>
+              <a:rPr lang="de-DE" dirty="0"/>
+              <a:t> on </a:t>
+            </a:r>
+            <a:r>
+              <a:rPr lang="de-DE" dirty="0" err="1"/>
+              <a:t>your</a:t>
+            </a:r>
+            <a:r>
+              <a:rPr lang="de-DE" dirty="0"/>
+              <a:t> own </a:t>
+            </a:r>
+            <a:r>
+              <a:rPr lang="de-DE" dirty="0" err="1"/>
+              <a:t>by</a:t>
+            </a:r>
+            <a:r>
+              <a:rPr lang="de-DE" dirty="0"/>
+              <a:t> </a:t>
+            </a:r>
+            <a:r>
+              <a:rPr lang="de-DE" dirty="0" err="1"/>
+              <a:t>installing</a:t>
+            </a:r>
+            <a:r>
+              <a:rPr lang="de-DE" dirty="0"/>
+              <a:t> </a:t>
+            </a:r>
+            <a:r>
+              <a:rPr lang="de-DE" dirty="0" err="1"/>
+              <a:t>the</a:t>
+            </a:r>
+            <a:r>
+              <a:rPr lang="de-DE" dirty="0"/>
+              <a:t> via </a:t>
+            </a:r>
+            <a:r>
+              <a:rPr lang="de-DE" dirty="0" err="1"/>
+              <a:t>bash</a:t>
+            </a:r>
+            <a:r>
+              <a:rPr lang="de-DE" dirty="0"/>
+              <a:t> and </a:t>
+            </a:r>
+            <a:r>
+              <a:rPr lang="de-DE" i="1" dirty="0" err="1"/>
+              <a:t>commit</a:t>
+            </a:r>
+            <a:r>
+              <a:rPr lang="de-DE" dirty="0"/>
+              <a:t> </a:t>
+            </a:r>
+            <a:r>
+              <a:rPr lang="de-DE" dirty="0" err="1"/>
+              <a:t>this</a:t>
+            </a:r>
+            <a:r>
+              <a:rPr lang="de-DE" dirty="0"/>
+              <a:t> </a:t>
+            </a:r>
+            <a:r>
+              <a:rPr lang="de-DE" dirty="0" err="1"/>
+              <a:t>changes</a:t>
+            </a:r>
+            <a:endParaRPr lang="de-DE" dirty="0"/>
+          </a:p>
+          <a:p>
+            <a:pPr lvl="1"/>
+            <a:r>
+              <a:rPr lang="de-DE" dirty="0"/>
+              <a:t>Create a </a:t>
+            </a:r>
+            <a:r>
+              <a:rPr lang="de-DE" i="1" dirty="0" err="1"/>
+              <a:t>Dockerfile</a:t>
+            </a:r>
+            <a:r>
+              <a:rPr lang="de-DE" dirty="0"/>
+              <a:t>, </a:t>
+            </a:r>
+            <a:r>
+              <a:rPr lang="de-DE" dirty="0" err="1"/>
+              <a:t>describe</a:t>
+            </a:r>
+            <a:r>
+              <a:rPr lang="de-DE" dirty="0"/>
+              <a:t> all </a:t>
+            </a:r>
+            <a:r>
+              <a:rPr lang="de-DE" dirty="0" err="1"/>
+              <a:t>changes</a:t>
+            </a:r>
+            <a:r>
+              <a:rPr lang="de-DE" dirty="0"/>
+              <a:t> </a:t>
+            </a:r>
+            <a:r>
+              <a:rPr lang="de-DE" dirty="0" err="1"/>
+              <a:t>which</a:t>
+            </a:r>
+            <a:r>
+              <a:rPr lang="de-DE" dirty="0"/>
+              <a:t> </a:t>
+            </a:r>
+            <a:r>
+              <a:rPr lang="de-DE" dirty="0" err="1"/>
+              <a:t>have</a:t>
+            </a:r>
+            <a:r>
+              <a:rPr lang="de-DE" dirty="0"/>
+              <a:t> </a:t>
+            </a:r>
+            <a:r>
+              <a:rPr lang="de-DE" dirty="0" err="1"/>
+              <a:t>to</a:t>
+            </a:r>
+            <a:r>
+              <a:rPr lang="de-DE" dirty="0"/>
+              <a:t> </a:t>
+            </a:r>
+            <a:r>
+              <a:rPr lang="de-DE" dirty="0" err="1"/>
+              <a:t>be</a:t>
+            </a:r>
+            <a:r>
+              <a:rPr lang="de-DE" dirty="0"/>
+              <a:t> </a:t>
+            </a:r>
+            <a:r>
+              <a:rPr lang="de-DE" dirty="0" err="1"/>
+              <a:t>made</a:t>
+            </a:r>
+            <a:r>
+              <a:rPr lang="de-DE" dirty="0"/>
+              <a:t> </a:t>
+            </a:r>
+            <a:r>
+              <a:rPr lang="de-DE" dirty="0" err="1"/>
+              <a:t>to</a:t>
+            </a:r>
+            <a:r>
+              <a:rPr lang="de-DE" dirty="0"/>
+              <a:t> </a:t>
+            </a:r>
+            <a:r>
+              <a:rPr lang="de-DE" dirty="0" err="1"/>
+              <a:t>the</a:t>
+            </a:r>
+            <a:r>
+              <a:rPr lang="de-DE" dirty="0"/>
+              <a:t> </a:t>
+            </a:r>
+            <a:r>
+              <a:rPr lang="de-DE" dirty="0" err="1"/>
+              <a:t>base</a:t>
+            </a:r>
+            <a:r>
+              <a:rPr lang="de-DE" dirty="0"/>
+              <a:t> </a:t>
+            </a:r>
+            <a:r>
+              <a:rPr lang="de-DE" dirty="0" err="1"/>
+              <a:t>image</a:t>
+            </a:r>
+            <a:r>
+              <a:rPr lang="de-DE" dirty="0"/>
+              <a:t> and </a:t>
+            </a:r>
+            <a:r>
+              <a:rPr lang="de-DE" dirty="0" err="1"/>
+              <a:t>build</a:t>
+            </a:r>
+            <a:r>
+              <a:rPr lang="de-DE" dirty="0"/>
+              <a:t> </a:t>
+            </a:r>
+            <a:r>
+              <a:rPr lang="de-DE" dirty="0" err="1"/>
+              <a:t>it</a:t>
+            </a:r>
+            <a:r>
+              <a:rPr lang="de-DE" dirty="0"/>
+              <a:t> </a:t>
+            </a:r>
+            <a:r>
+              <a:rPr lang="de-DE" dirty="0" err="1"/>
+              <a:t>with</a:t>
+            </a:r>
+            <a:r>
+              <a:rPr lang="de-DE" dirty="0"/>
+              <a:t> </a:t>
+            </a:r>
+            <a:r>
+              <a:rPr lang="de-DE" dirty="0" err="1"/>
+              <a:t>the</a:t>
+            </a:r>
+            <a:r>
+              <a:rPr lang="de-DE" dirty="0"/>
+              <a:t> Docker CLI</a:t>
+            </a:r>
+          </a:p>
+          <a:p>
+            <a:r>
+              <a:rPr lang="de-DE" dirty="0"/>
+              <a:t>Most </a:t>
+            </a:r>
+            <a:r>
+              <a:rPr lang="de-DE" dirty="0" err="1"/>
+              <a:t>containers</a:t>
+            </a:r>
+            <a:r>
+              <a:rPr lang="de-DE" dirty="0"/>
+              <a:t> </a:t>
+            </a:r>
+            <a:r>
+              <a:rPr lang="de-DE" dirty="0" err="1"/>
+              <a:t>are</a:t>
+            </a:r>
+            <a:r>
+              <a:rPr lang="de-DE" dirty="0"/>
+              <a:t> </a:t>
+            </a:r>
+            <a:r>
+              <a:rPr lang="de-DE" dirty="0" err="1"/>
+              <a:t>built</a:t>
+            </a:r>
+            <a:r>
+              <a:rPr lang="de-DE" dirty="0"/>
+              <a:t> </a:t>
+            </a:r>
+            <a:r>
+              <a:rPr lang="de-DE" dirty="0" err="1"/>
+              <a:t>with</a:t>
+            </a:r>
+            <a:r>
+              <a:rPr lang="de-DE" dirty="0"/>
+              <a:t> </a:t>
+            </a:r>
+            <a:r>
+              <a:rPr lang="de-DE" dirty="0" err="1"/>
+              <a:t>Dockerfiles</a:t>
+            </a:r>
+            <a:r>
+              <a:rPr lang="de-DE" dirty="0"/>
+              <a:t> </a:t>
+            </a:r>
+            <a:r>
+              <a:rPr lang="de-DE" dirty="0" err="1"/>
+              <a:t>because</a:t>
+            </a:r>
+            <a:r>
+              <a:rPr lang="de-DE" dirty="0"/>
+              <a:t> </a:t>
+            </a:r>
+            <a:r>
+              <a:rPr lang="de-DE" dirty="0" err="1"/>
+              <a:t>it‘s</a:t>
+            </a:r>
+            <a:r>
+              <a:rPr lang="de-DE" dirty="0"/>
+              <a:t> </a:t>
+            </a:r>
+            <a:r>
+              <a:rPr lang="de-DE" dirty="0" err="1"/>
+              <a:t>easier</a:t>
+            </a:r>
+            <a:r>
+              <a:rPr lang="de-DE" dirty="0"/>
+              <a:t> </a:t>
+            </a:r>
+            <a:r>
+              <a:rPr lang="de-DE" dirty="0" err="1"/>
+              <a:t>to</a:t>
+            </a:r>
+            <a:r>
+              <a:rPr lang="de-DE" dirty="0"/>
+              <a:t> </a:t>
+            </a:r>
+            <a:r>
+              <a:rPr lang="de-DE" dirty="0" err="1"/>
+              <a:t>make</a:t>
+            </a:r>
+            <a:r>
+              <a:rPr lang="de-DE" dirty="0"/>
+              <a:t> </a:t>
+            </a:r>
+            <a:r>
+              <a:rPr lang="de-DE" dirty="0" err="1"/>
+              <a:t>small</a:t>
+            </a:r>
+            <a:r>
+              <a:rPr lang="de-DE" dirty="0"/>
+              <a:t> </a:t>
+            </a:r>
+            <a:r>
+              <a:rPr lang="de-DE" dirty="0" err="1"/>
+              <a:t>changes</a:t>
+            </a:r>
+            <a:r>
+              <a:rPr lang="de-DE" dirty="0"/>
+              <a:t> and </a:t>
+            </a:r>
+            <a:r>
+              <a:rPr lang="de-DE" dirty="0" err="1"/>
+              <a:t>recreate</a:t>
+            </a:r>
+            <a:r>
+              <a:rPr lang="de-DE" dirty="0"/>
+              <a:t> an </a:t>
+            </a:r>
+            <a:r>
+              <a:rPr lang="de-DE" dirty="0" err="1"/>
+              <a:t>image</a:t>
+            </a:r>
+            <a:r>
+              <a:rPr lang="de-DE" dirty="0"/>
+              <a:t>, </a:t>
+            </a:r>
+            <a:r>
+              <a:rPr lang="de-DE" dirty="0" err="1"/>
+              <a:t>building</a:t>
+            </a:r>
+            <a:r>
+              <a:rPr lang="de-DE" dirty="0"/>
+              <a:t> </a:t>
+            </a:r>
+            <a:r>
+              <a:rPr lang="de-DE" dirty="0" err="1"/>
+              <a:t>containers</a:t>
+            </a:r>
+            <a:r>
+              <a:rPr lang="de-DE" dirty="0"/>
+              <a:t> </a:t>
+            </a:r>
+            <a:r>
+              <a:rPr lang="de-DE" dirty="0" err="1"/>
+              <a:t>manually</a:t>
+            </a:r>
+            <a:r>
+              <a:rPr lang="de-DE" dirty="0"/>
+              <a:t> </a:t>
+            </a:r>
+            <a:r>
+              <a:rPr lang="de-DE" dirty="0" err="1"/>
+              <a:t>is</a:t>
+            </a:r>
+            <a:r>
+              <a:rPr lang="de-DE" dirty="0"/>
+              <a:t> </a:t>
+            </a:r>
+            <a:r>
+              <a:rPr lang="de-DE" dirty="0" err="1"/>
+              <a:t>only</a:t>
+            </a:r>
+            <a:r>
+              <a:rPr lang="de-DE" dirty="0"/>
+              <a:t> </a:t>
+            </a:r>
+            <a:r>
+              <a:rPr lang="de-DE" dirty="0" err="1"/>
+              <a:t>acceptable</a:t>
+            </a:r>
+            <a:r>
+              <a:rPr lang="de-DE" dirty="0"/>
+              <a:t> </a:t>
+            </a:r>
+            <a:r>
+              <a:rPr lang="de-DE" dirty="0" err="1"/>
+              <a:t>for</a:t>
+            </a:r>
+            <a:r>
+              <a:rPr lang="de-DE" dirty="0"/>
+              <a:t> </a:t>
+            </a:r>
+            <a:r>
+              <a:rPr lang="de-DE"/>
+              <a:t>proof-of-concepts</a:t>
+            </a:r>
+            <a:endParaRPr lang="de-DE" dirty="0"/>
+          </a:p>
+        </p:txBody>
+      </p:sp>
+    </p:spTree>
+    <p:extLst>
+      <p:ext uri="{BB962C8B-B14F-4D97-AF65-F5344CB8AC3E}">
+        <p14:creationId xmlns:p14="http://schemas.microsoft.com/office/powerpoint/2010/main" val="4062149966"/>
+      </p:ext>
+    </p:extLst>
+  </p:cSld>
+  <p:clrMapOvr>
+    <a:masterClrMapping/>
+  </p:clrMapOvr>
+</p:sld>
+</file>
+
+<file path=ppt/slides/slide16.xml><?xml version="1.0" encoding="utf-8"?>
+<p:sld xmlns:a="http://schemas.openxmlformats.org/drawingml/2006/main" xmlns:r="http://schemas.openxmlformats.org/officeDocument/2006/relationships" xmlns:p="http://schemas.openxmlformats.org/presentationml/2006/main">
+  <p:cSld>
+    <p:spTree>
+      <p:nvGrpSpPr>
+        <p:cNvPr id="1" name=""/>
+        <p:cNvGrpSpPr/>
+        <p:nvPr/>
+      </p:nvGrpSpPr>
+      <p:grpSpPr>
+        <a:xfrm>
+          <a:off x="0" y="0"/>
+          <a:ext cx="0" cy="0"/>
+          <a:chOff x="0" y="0"/>
+          <a:chExt cx="0" cy="0"/>
+        </a:xfrm>
+      </p:grpSpPr>
+      <p:sp>
+        <p:nvSpPr>
+          <p:cNvPr id="4" name="Titel 3">
+            <a:extLst>
+              <a:ext uri="{FF2B5EF4-FFF2-40B4-BE49-F238E27FC236}">
+                <a16:creationId xmlns:a16="http://schemas.microsoft.com/office/drawing/2014/main" id="{A18A07F3-306F-4AA7-915C-597538F8F1CC}"/>
+              </a:ext>
+            </a:extLst>
+          </p:cNvPr>
+          <p:cNvSpPr>
+            <a:spLocks noGrp="1"/>
+          </p:cNvSpPr>
+          <p:nvPr>
+            <p:ph type="title"/>
+          </p:nvPr>
+        </p:nvSpPr>
+        <p:spPr/>
+        <p:txBody>
+          <a:bodyPr/>
+          <a:lstStyle/>
+          <a:p>
+            <a:r>
+              <a:rPr lang="en-US" dirty="0" err="1"/>
+              <a:t>Dockerfile</a:t>
+            </a:r>
+            <a:r>
+              <a:rPr lang="en-US" dirty="0"/>
+              <a:t> – </a:t>
+            </a:r>
+            <a:r>
+              <a:rPr lang="en-US" dirty="0" err="1"/>
+              <a:t>Beispiel</a:t>
+            </a:r>
+            <a:r>
+              <a:rPr lang="en-US" dirty="0"/>
+              <a:t> </a:t>
+            </a:r>
+            <a:r>
+              <a:rPr lang="en-US" dirty="0" err="1"/>
+              <a:t>BeakerX</a:t>
+            </a:r>
+            <a:endParaRPr lang="en-US" dirty="0"/>
+          </a:p>
+        </p:txBody>
+      </p:sp>
+      <mc:AlternateContent xmlns:mc="http://schemas.openxmlformats.org/markup-compatibility/2006">
+        <mc:Choice xmlns:we="http://schemas.microsoft.com/office/webextensions/webextension/2010/11" xmlns:pca="http://schemas.microsoft.com/office/powerpoint/2013/contentapp" Requires="we pca">
+          <p:graphicFrame>
+            <p:nvGraphicFramePr>
+              <p:cNvPr id="6" name="Inhaltsplatzhalter 5" title="Code Presenter Pro">
+                <a:extLst>
+                  <a:ext uri="{FF2B5EF4-FFF2-40B4-BE49-F238E27FC236}">
+                    <a16:creationId xmlns:a16="http://schemas.microsoft.com/office/drawing/2014/main" id="{310DA27B-5901-49C6-9C79-7F39E01A72B4}"/>
+                  </a:ext>
+                </a:extLst>
+              </p:cNvPr>
+              <p:cNvGraphicFramePr>
+                <a:graphicFrameLocks noGrp="1"/>
+              </p:cNvGraphicFramePr>
+              <p:nvPr>
+                <p:ph idx="1"/>
+              </p:nvPr>
+            </p:nvGraphicFramePr>
+            <p:xfrm>
+              <a:off x="258763" y="1403350"/>
+              <a:ext cx="8697912" cy="4846638"/>
+            </p:xfrm>
+            <a:graphic>
+              <a:graphicData uri="http://schemas.microsoft.com/office/webextensions/webextension/2010/11">
+                <we:webextensionref xmlns:we="http://schemas.microsoft.com/office/webextensions/webextension/2010/11" xmlns:r="http://schemas.openxmlformats.org/officeDocument/2006/relationships" r:id="rId3"/>
+              </a:graphicData>
+            </a:graphic>
+          </p:graphicFrame>
+        </mc:Choice>
+        <mc:Fallback>
+          <p:pic>
+            <p:nvPicPr>
+              <p:cNvPr id="6" name="Inhaltsplatzhalter 5" title="Code Presenter Pro">
+                <a:extLst>
+                  <a:ext uri="{FF2B5EF4-FFF2-40B4-BE49-F238E27FC236}">
+                    <a16:creationId xmlns:a16="http://schemas.microsoft.com/office/drawing/2014/main" id="{310DA27B-5901-49C6-9C79-7F39E01A72B4}"/>
+                  </a:ext>
+                </a:extLst>
+              </p:cNvPr>
+              <p:cNvPicPr>
+                <a:picLocks noGrp="1" noRot="1" noChangeAspect="1" noMove="1" noResize="1" noEditPoints="1" noAdjustHandles="1" noChangeArrowheads="1" noChangeShapeType="1"/>
+              </p:cNvPicPr>
+              <p:nvPr/>
+            </p:nvPicPr>
+            <p:blipFill>
+              <a:blip r:embed="rId4"/>
+              <a:stretch>
+                <a:fillRect/>
+              </a:stretch>
+            </p:blipFill>
+            <p:spPr>
+              <a:xfrm>
+                <a:off x="258763" y="1403350"/>
+                <a:ext cx="8697912" cy="4846638"/>
+              </a:xfrm>
+              <a:prstGeom prst="rect">
+                <a:avLst/>
+              </a:prstGeom>
+            </p:spPr>
+          </p:pic>
+        </mc:Fallback>
+      </mc:AlternateContent>
+    </p:spTree>
+    <p:extLst>
+      <p:ext uri="{BB962C8B-B14F-4D97-AF65-F5344CB8AC3E}">
+        <p14:creationId xmlns:p14="http://schemas.microsoft.com/office/powerpoint/2010/main" val="2987713808"/>
+      </p:ext>
+    </p:extLst>
+  </p:cSld>
+  <p:clrMapOvr>
+    <a:masterClrMapping/>
+  </p:clrMapOvr>
+</p:sld>
+</file>
+
+<file path=ppt/slides/slide17.xml><?xml version="1.0" encoding="utf-8"?>
+<p:sld xmlns:a="http://schemas.openxmlformats.org/drawingml/2006/main" xmlns:r="http://schemas.openxmlformats.org/officeDocument/2006/relationships" xmlns:p="http://schemas.openxmlformats.org/presentationml/2006/main">
+  <p:cSld>
+    <p:spTree>
+      <p:nvGrpSpPr>
+        <p:cNvPr id="1" name=""/>
+        <p:cNvGrpSpPr/>
+        <p:nvPr/>
+      </p:nvGrpSpPr>
+      <p:grpSpPr>
+        <a:xfrm>
+          <a:off x="0" y="0"/>
+          <a:ext cx="0" cy="0"/>
+          <a:chOff x="0" y="0"/>
+          <a:chExt cx="0" cy="0"/>
+        </a:xfrm>
+      </p:grpSpPr>
+      <p:sp>
+        <p:nvSpPr>
+          <p:cNvPr id="4" name="Titel 3">
+            <a:extLst>
+              <a:ext uri="{FF2B5EF4-FFF2-40B4-BE49-F238E27FC236}">
+                <a16:creationId xmlns:a16="http://schemas.microsoft.com/office/drawing/2014/main" id="{A10680A1-C0FE-493E-8D2C-96FB2384E033}"/>
+              </a:ext>
+            </a:extLst>
+          </p:cNvPr>
+          <p:cNvSpPr>
+            <a:spLocks noGrp="1"/>
+          </p:cNvSpPr>
+          <p:nvPr>
+            <p:ph type="title"/>
+          </p:nvPr>
+        </p:nvSpPr>
+        <p:spPr/>
+        <p:txBody>
+          <a:bodyPr/>
+          <a:lstStyle/>
+          <a:p>
+            <a:r>
+              <a:rPr lang="en-US" dirty="0" err="1"/>
+              <a:t>Dockerfile</a:t>
+            </a:r>
+            <a:endParaRPr lang="en-US" dirty="0"/>
+          </a:p>
+        </p:txBody>
+      </p:sp>
+      <p:graphicFrame>
+        <p:nvGraphicFramePr>
+          <p:cNvPr id="2" name="Inhaltsplatzhalter 1">
+            <a:extLst>
+              <a:ext uri="{FF2B5EF4-FFF2-40B4-BE49-F238E27FC236}">
+                <a16:creationId xmlns:a16="http://schemas.microsoft.com/office/drawing/2014/main" id="{4906C80B-A7DE-4E26-845D-2D7A48EABA71}"/>
+              </a:ext>
+            </a:extLst>
+          </p:cNvPr>
+          <p:cNvGraphicFramePr>
+            <a:graphicFrameLocks noGrp="1"/>
+          </p:cNvGraphicFramePr>
+          <p:nvPr>
+            <p:ph idx="1"/>
+            <p:extLst>
+              <p:ext uri="{D42A27DB-BD31-4B8C-83A1-F6EECF244321}">
+                <p14:modId xmlns:p14="http://schemas.microsoft.com/office/powerpoint/2010/main" val="1226902385"/>
+              </p:ext>
+            </p:extLst>
+          </p:nvPr>
+        </p:nvGraphicFramePr>
+        <p:xfrm>
+          <a:off x="258763" y="1403350"/>
+          <a:ext cx="8697912" cy="4927981"/>
+        </p:xfrm>
+        <a:graphic>
+          <a:graphicData uri="http://schemas.openxmlformats.org/drawingml/2006/table">
+            <a:tbl>
+              <a:tblPr firstRow="1" bandRow="1">
+                <a:tableStyleId>{5C22544A-7EE6-4342-B048-85BDC9FD1C3A}</a:tableStyleId>
+              </a:tblPr>
+              <a:tblGrid>
+                <a:gridCol w="4108521">
+                  <a:extLst>
+                    <a:ext uri="{9D8B030D-6E8A-4147-A177-3AD203B41FA5}">
+                      <a16:colId xmlns:a16="http://schemas.microsoft.com/office/drawing/2014/main" val="4179664450"/>
+                    </a:ext>
+                  </a:extLst>
+                </a:gridCol>
+                <a:gridCol w="4589391">
+                  <a:extLst>
+                    <a:ext uri="{9D8B030D-6E8A-4147-A177-3AD203B41FA5}">
+                      <a16:colId xmlns:a16="http://schemas.microsoft.com/office/drawing/2014/main" val="768462172"/>
+                    </a:ext>
+                  </a:extLst>
+                </a:gridCol>
+              </a:tblGrid>
+              <a:tr h="370840">
+                <a:tc>
+                  <a:txBody>
+                    <a:bodyPr/>
+                    <a:lstStyle/>
+                    <a:p>
+                      <a:r>
+                        <a:rPr lang="en-US" dirty="0"/>
+                        <a:t>Directive</a:t>
+                      </a:r>
+                    </a:p>
+                  </a:txBody>
+                  <a:tcPr/>
+                </a:tc>
+                <a:tc>
+                  <a:txBody>
+                    <a:bodyPr/>
+                    <a:lstStyle/>
+                    <a:p>
+                      <a:r>
+                        <a:rPr lang="en-US" dirty="0"/>
+                        <a:t>Explanation</a:t>
+                      </a:r>
+                    </a:p>
+                  </a:txBody>
+                  <a:tcPr/>
+                </a:tc>
+                <a:extLst>
+                  <a:ext uri="{0D108BD9-81ED-4DB2-BD59-A6C34878D82A}">
+                    <a16:rowId xmlns:a16="http://schemas.microsoft.com/office/drawing/2014/main" val="887300625"/>
+                  </a:ext>
+                </a:extLst>
+              </a:tr>
+              <a:tr h="370840">
+                <a:tc>
+                  <a:txBody>
+                    <a:bodyPr/>
+                    <a:lstStyle/>
+                    <a:p>
+                      <a:r>
+                        <a:rPr lang="en-US" dirty="0"/>
+                        <a:t>FROM &lt;image&gt;[:tag]</a:t>
+                      </a:r>
+                    </a:p>
+                  </a:txBody>
+                  <a:tcPr/>
+                </a:tc>
+                <a:tc>
+                  <a:txBody>
+                    <a:bodyPr/>
+                    <a:lstStyle/>
+                    <a:p>
+                      <a:r>
+                        <a:rPr lang="en-US" dirty="0"/>
+                        <a:t>Declares base image which will be used</a:t>
+                      </a:r>
+                    </a:p>
+                  </a:txBody>
+                  <a:tcPr/>
+                </a:tc>
+                <a:extLst>
+                  <a:ext uri="{0D108BD9-81ED-4DB2-BD59-A6C34878D82A}">
+                    <a16:rowId xmlns:a16="http://schemas.microsoft.com/office/drawing/2014/main" val="2570652970"/>
+                  </a:ext>
+                </a:extLst>
+              </a:tr>
+              <a:tr h="370840">
+                <a:tc>
+                  <a:txBody>
+                    <a:bodyPr/>
+                    <a:lstStyle/>
+                    <a:p>
+                      <a:r>
+                        <a:rPr lang="de-DE" dirty="0"/>
+                        <a:t>RUN &lt;</a:t>
+                      </a:r>
+                      <a:r>
+                        <a:rPr lang="de-DE" dirty="0" err="1"/>
+                        <a:t>command</a:t>
+                      </a:r>
+                      <a:r>
+                        <a:rPr lang="de-DE" dirty="0"/>
+                        <a:t>&gt;</a:t>
+                      </a:r>
+                      <a:endParaRPr lang="en-US" dirty="0"/>
+                    </a:p>
+                  </a:txBody>
+                  <a:tcPr/>
+                </a:tc>
+                <a:tc>
+                  <a:txBody>
+                    <a:bodyPr/>
+                    <a:lstStyle/>
+                    <a:p>
+                      <a:r>
+                        <a:rPr lang="en-US" dirty="0"/>
+                        <a:t>Command to run while building the container (creates a new layer)</a:t>
+                      </a:r>
+                    </a:p>
+                  </a:txBody>
+                  <a:tcPr/>
+                </a:tc>
+                <a:extLst>
+                  <a:ext uri="{0D108BD9-81ED-4DB2-BD59-A6C34878D82A}">
+                    <a16:rowId xmlns:a16="http://schemas.microsoft.com/office/drawing/2014/main" val="878705960"/>
+                  </a:ext>
+                </a:extLst>
+              </a:tr>
+              <a:tr h="370840">
+                <a:tc>
+                  <a:txBody>
+                    <a:bodyPr/>
+                    <a:lstStyle/>
+                    <a:p>
+                      <a:r>
+                        <a:rPr lang="de-DE" dirty="0"/>
+                        <a:t>CMD [ „</a:t>
+                      </a:r>
+                      <a:r>
+                        <a:rPr lang="de-DE" dirty="0" err="1"/>
+                        <a:t>executable</a:t>
+                      </a:r>
+                      <a:r>
+                        <a:rPr lang="de-DE" dirty="0"/>
+                        <a:t>“, „param1“, „param2“ ]</a:t>
+                      </a:r>
+                      <a:endParaRPr lang="en-US" dirty="0"/>
+                    </a:p>
+                  </a:txBody>
+                  <a:tcPr/>
+                </a:tc>
+                <a:tc>
+                  <a:txBody>
+                    <a:bodyPr/>
+                    <a:lstStyle/>
+                    <a:p>
+                      <a:r>
+                        <a:rPr lang="en-US" dirty="0"/>
+                        <a:t>Provide a default command when a new container is started</a:t>
+                      </a:r>
+                    </a:p>
+                  </a:txBody>
+                  <a:tcPr/>
+                </a:tc>
+                <a:extLst>
+                  <a:ext uri="{0D108BD9-81ED-4DB2-BD59-A6C34878D82A}">
+                    <a16:rowId xmlns:a16="http://schemas.microsoft.com/office/drawing/2014/main" val="1676345038"/>
+                  </a:ext>
+                </a:extLst>
+              </a:tr>
+              <a:tr h="370840">
+                <a:tc>
+                  <a:txBody>
+                    <a:bodyPr/>
+                    <a:lstStyle/>
+                    <a:p>
+                      <a:r>
+                        <a:rPr lang="de-DE" dirty="0"/>
+                        <a:t>EXPOSE</a:t>
+                      </a:r>
+                      <a:endParaRPr lang="en-US" dirty="0"/>
+                    </a:p>
+                  </a:txBody>
+                  <a:tcPr/>
+                </a:tc>
+                <a:tc>
+                  <a:txBody>
+                    <a:bodyPr/>
+                    <a:lstStyle/>
+                    <a:p>
+                      <a:r>
+                        <a:rPr lang="en-US" dirty="0"/>
+                        <a:t>Declare a port which will be exposed by the container (e.g. 80 for Nginx)</a:t>
+                      </a:r>
+                    </a:p>
+                  </a:txBody>
+                  <a:tcPr/>
+                </a:tc>
+                <a:extLst>
+                  <a:ext uri="{0D108BD9-81ED-4DB2-BD59-A6C34878D82A}">
+                    <a16:rowId xmlns:a16="http://schemas.microsoft.com/office/drawing/2014/main" val="1108313170"/>
+                  </a:ext>
+                </a:extLst>
+              </a:tr>
+              <a:tr h="370840">
+                <a:tc>
+                  <a:txBody>
+                    <a:bodyPr/>
+                    <a:lstStyle/>
+                    <a:p>
+                      <a:r>
+                        <a:rPr lang="de-DE" dirty="0"/>
+                        <a:t>ENV &lt;</a:t>
+                      </a:r>
+                      <a:r>
+                        <a:rPr lang="de-DE" dirty="0" err="1"/>
+                        <a:t>key</a:t>
+                      </a:r>
+                      <a:r>
+                        <a:rPr lang="de-DE" dirty="0"/>
+                        <a:t>&gt; &lt;</a:t>
+                      </a:r>
+                      <a:r>
+                        <a:rPr lang="de-DE" dirty="0" err="1"/>
+                        <a:t>value</a:t>
+                      </a:r>
+                      <a:r>
+                        <a:rPr lang="de-DE" dirty="0"/>
+                        <a:t>&gt;</a:t>
+                      </a:r>
+                      <a:endParaRPr lang="en-US" dirty="0"/>
+                    </a:p>
+                  </a:txBody>
+                  <a:tcPr/>
+                </a:tc>
+                <a:tc>
+                  <a:txBody>
+                    <a:bodyPr/>
+                    <a:lstStyle/>
+                    <a:p>
+                      <a:r>
+                        <a:rPr lang="en-US" dirty="0"/>
+                        <a:t>Declare an environment variable for the container</a:t>
+                      </a:r>
+                    </a:p>
+                  </a:txBody>
+                  <a:tcPr/>
+                </a:tc>
+                <a:extLst>
+                  <a:ext uri="{0D108BD9-81ED-4DB2-BD59-A6C34878D82A}">
+                    <a16:rowId xmlns:a16="http://schemas.microsoft.com/office/drawing/2014/main" val="3146666656"/>
+                  </a:ext>
+                </a:extLst>
+              </a:tr>
+              <a:tr h="370840">
+                <a:tc>
+                  <a:txBody>
+                    <a:bodyPr/>
+                    <a:lstStyle/>
+                    <a:p>
+                      <a:r>
+                        <a:rPr lang="de-DE" dirty="0"/>
+                        <a:t>ADD &lt;</a:t>
+                      </a:r>
+                      <a:r>
+                        <a:rPr lang="de-DE" dirty="0" err="1"/>
+                        <a:t>src</a:t>
+                      </a:r>
+                      <a:r>
+                        <a:rPr lang="de-DE" dirty="0"/>
+                        <a:t>&gt; &lt;</a:t>
+                      </a:r>
+                      <a:r>
+                        <a:rPr lang="de-DE" dirty="0" err="1"/>
+                        <a:t>dest</a:t>
+                      </a:r>
+                      <a:r>
+                        <a:rPr lang="de-DE" dirty="0"/>
+                        <a:t>&gt;</a:t>
+                      </a:r>
+                      <a:endParaRPr lang="en-US" dirty="0"/>
+                    </a:p>
+                  </a:txBody>
+                  <a:tcPr/>
+                </a:tc>
+                <a:tc>
+                  <a:txBody>
+                    <a:bodyPr/>
+                    <a:lstStyle/>
+                    <a:p>
+                      <a:r>
+                        <a:rPr lang="en-US" dirty="0"/>
+                        <a:t>Copy files or directories from local or remote URLs into the container</a:t>
+                      </a:r>
+                    </a:p>
+                  </a:txBody>
+                  <a:tcPr/>
+                </a:tc>
+                <a:extLst>
+                  <a:ext uri="{0D108BD9-81ED-4DB2-BD59-A6C34878D82A}">
+                    <a16:rowId xmlns:a16="http://schemas.microsoft.com/office/drawing/2014/main" val="3268384135"/>
+                  </a:ext>
+                </a:extLst>
+              </a:tr>
+              <a:tr h="370840">
+                <a:tc>
+                  <a:txBody>
+                    <a:bodyPr/>
+                    <a:lstStyle/>
+                    <a:p>
+                      <a:r>
+                        <a:rPr lang="de-DE" dirty="0"/>
+                        <a:t>COPY</a:t>
+                      </a:r>
+                      <a:endParaRPr lang="en-US" dirty="0"/>
+                    </a:p>
+                  </a:txBody>
+                  <a:tcPr/>
+                </a:tc>
+                <a:tc>
+                  <a:txBody>
+                    <a:bodyPr/>
+                    <a:lstStyle/>
+                    <a:p>
+                      <a:r>
+                        <a:rPr lang="en-US" dirty="0"/>
+                        <a:t>Copy files or directories from local URLs into the container</a:t>
+                      </a:r>
+                    </a:p>
+                  </a:txBody>
+                  <a:tcPr/>
+                </a:tc>
+                <a:extLst>
+                  <a:ext uri="{0D108BD9-81ED-4DB2-BD59-A6C34878D82A}">
+                    <a16:rowId xmlns:a16="http://schemas.microsoft.com/office/drawing/2014/main" val="3830072702"/>
+                  </a:ext>
+                </a:extLst>
+              </a:tr>
+              <a:tr h="370840">
+                <a:tc>
+                  <a:txBody>
+                    <a:bodyPr/>
+                    <a:lstStyle/>
+                    <a:p>
+                      <a:r>
+                        <a:rPr lang="de-DE" dirty="0"/>
+                        <a:t>ENTRYPOINT [ „</a:t>
+                      </a:r>
+                      <a:r>
+                        <a:rPr lang="de-DE" dirty="0" err="1"/>
+                        <a:t>executable</a:t>
+                      </a:r>
+                      <a:r>
+                        <a:rPr lang="de-DE" dirty="0"/>
+                        <a:t>“, „param1“, „param2“ ]</a:t>
+                      </a:r>
+                      <a:endParaRPr lang="en-US" dirty="0"/>
+                    </a:p>
+                  </a:txBody>
+                  <a:tcPr/>
+                </a:tc>
+                <a:tc>
+                  <a:txBody>
+                    <a:bodyPr/>
+                    <a:lstStyle/>
+                    <a:p>
+                      <a:r>
+                        <a:rPr lang="en-US" dirty="0"/>
+                        <a:t>Declare the </a:t>
+                      </a:r>
+                      <a:r>
+                        <a:rPr lang="en-US" dirty="0" err="1"/>
+                        <a:t>entrypoint</a:t>
+                      </a:r>
+                      <a:r>
+                        <a:rPr lang="en-US" dirty="0"/>
+                        <a:t> of the container when it’s started</a:t>
+                      </a:r>
+                    </a:p>
+                  </a:txBody>
+                  <a:tcPr/>
+                </a:tc>
+                <a:extLst>
+                  <a:ext uri="{0D108BD9-81ED-4DB2-BD59-A6C34878D82A}">
+                    <a16:rowId xmlns:a16="http://schemas.microsoft.com/office/drawing/2014/main" val="2931670196"/>
+                  </a:ext>
+                </a:extLst>
+              </a:tr>
+            </a:tbl>
+          </a:graphicData>
+        </a:graphic>
+      </p:graphicFrame>
+    </p:spTree>
+    <p:extLst>
+      <p:ext uri="{BB962C8B-B14F-4D97-AF65-F5344CB8AC3E}">
+        <p14:creationId xmlns:p14="http://schemas.microsoft.com/office/powerpoint/2010/main" val="1360839841"/>
+      </p:ext>
+    </p:extLst>
+  </p:cSld>
+  <p:clrMapOvr>
+    <a:masterClrMapping/>
+  </p:clrMapOvr>
+</p:sld>
+</file>
+
+<file path=ppt/slides/slide18.xml><?xml version="1.0" encoding="utf-8"?>
+<p:sld xmlns:a="http://schemas.openxmlformats.org/drawingml/2006/main" xmlns:r="http://schemas.openxmlformats.org/officeDocument/2006/relationships" xmlns:p="http://schemas.openxmlformats.org/presentationml/2006/main">
+  <p:cSld>
+    <p:spTree>
+      <p:nvGrpSpPr>
+        <p:cNvPr id="1" name=""/>
+        <p:cNvGrpSpPr/>
+        <p:nvPr/>
+      </p:nvGrpSpPr>
+      <p:grpSpPr>
+        <a:xfrm>
+          <a:off x="0" y="0"/>
+          <a:ext cx="0" cy="0"/>
+          <a:chOff x="0" y="0"/>
+          <a:chExt cx="0" cy="0"/>
+        </a:xfrm>
+      </p:grpSpPr>
+      <p:sp>
+        <p:nvSpPr>
+          <p:cNvPr id="4" name="Titel 3">
+            <a:extLst>
+              <a:ext uri="{FF2B5EF4-FFF2-40B4-BE49-F238E27FC236}">
+                <a16:creationId xmlns:a16="http://schemas.microsoft.com/office/drawing/2014/main" id="{03B0B359-5B37-4553-A72E-90A818DB7C2E}"/>
+              </a:ext>
+            </a:extLst>
+          </p:cNvPr>
+          <p:cNvSpPr>
+            <a:spLocks noGrp="1"/>
+          </p:cNvSpPr>
+          <p:nvPr>
+            <p:ph type="title"/>
+          </p:nvPr>
+        </p:nvSpPr>
+        <p:spPr/>
+        <p:txBody>
+          <a:bodyPr/>
+          <a:lstStyle/>
+          <a:p>
+            <a:r>
+              <a:rPr lang="en-US" dirty="0" err="1"/>
+              <a:t>Dockerfile</a:t>
+            </a:r>
+            <a:endParaRPr lang="en-US" dirty="0"/>
+          </a:p>
+        </p:txBody>
+      </p:sp>
+      <p:graphicFrame>
+        <p:nvGraphicFramePr>
+          <p:cNvPr id="6" name="Inhaltsplatzhalter 5">
+            <a:extLst>
+              <a:ext uri="{FF2B5EF4-FFF2-40B4-BE49-F238E27FC236}">
+                <a16:creationId xmlns:a16="http://schemas.microsoft.com/office/drawing/2014/main" id="{2BB7D1C6-72DF-4F74-A1FD-D7E23A8404EB}"/>
+              </a:ext>
+            </a:extLst>
+          </p:cNvPr>
+          <p:cNvGraphicFramePr>
+            <a:graphicFrameLocks noGrp="1"/>
+          </p:cNvGraphicFramePr>
+          <p:nvPr>
+            <p:ph idx="1"/>
+            <p:extLst>
+              <p:ext uri="{D42A27DB-BD31-4B8C-83A1-F6EECF244321}">
+                <p14:modId xmlns:p14="http://schemas.microsoft.com/office/powerpoint/2010/main" val="269230145"/>
+              </p:ext>
+            </p:extLst>
+          </p:nvPr>
+        </p:nvGraphicFramePr>
+        <p:xfrm>
+          <a:off x="258763" y="1403350"/>
+          <a:ext cx="8697912" cy="3684779"/>
+        </p:xfrm>
+        <a:graphic>
+          <a:graphicData uri="http://schemas.openxmlformats.org/drawingml/2006/table">
+            <a:tbl>
+              <a:tblPr firstRow="1" bandRow="1">
+                <a:tableStyleId>{5C22544A-7EE6-4342-B048-85BDC9FD1C3A}</a:tableStyleId>
+              </a:tblPr>
+              <a:tblGrid>
+                <a:gridCol w="4348956">
+                  <a:extLst>
+                    <a:ext uri="{9D8B030D-6E8A-4147-A177-3AD203B41FA5}">
+                      <a16:colId xmlns:a16="http://schemas.microsoft.com/office/drawing/2014/main" val="3368871101"/>
+                    </a:ext>
+                  </a:extLst>
+                </a:gridCol>
+                <a:gridCol w="4348956">
+                  <a:extLst>
+                    <a:ext uri="{9D8B030D-6E8A-4147-A177-3AD203B41FA5}">
+                      <a16:colId xmlns:a16="http://schemas.microsoft.com/office/drawing/2014/main" val="3885861514"/>
+                    </a:ext>
+                  </a:extLst>
+                </a:gridCol>
+              </a:tblGrid>
+              <a:tr h="370840">
+                <a:tc>
+                  <a:txBody>
+                    <a:bodyPr/>
+                    <a:lstStyle/>
+                    <a:p>
+                      <a:r>
+                        <a:rPr lang="en-US" dirty="0"/>
+                        <a:t>Directive</a:t>
+                      </a:r>
+                    </a:p>
+                  </a:txBody>
+                  <a:tcPr/>
+                </a:tc>
+                <a:tc>
+                  <a:txBody>
+                    <a:bodyPr/>
+                    <a:lstStyle/>
+                    <a:p>
+                      <a:r>
+                        <a:rPr lang="en-US" dirty="0"/>
+                        <a:t>Explanation</a:t>
+                      </a:r>
+                    </a:p>
+                  </a:txBody>
+                  <a:tcPr/>
+                </a:tc>
+                <a:extLst>
+                  <a:ext uri="{0D108BD9-81ED-4DB2-BD59-A6C34878D82A}">
+                    <a16:rowId xmlns:a16="http://schemas.microsoft.com/office/drawing/2014/main" val="2026998094"/>
+                  </a:ext>
+                </a:extLst>
+              </a:tr>
+              <a:tr h="370840">
+                <a:tc>
+                  <a:txBody>
+                    <a:bodyPr/>
+                    <a:lstStyle/>
+                    <a:p>
+                      <a:pPr marL="0" marR="0" lvl="0" indent="0" algn="l" defTabSz="844083" rtl="0" eaLnBrk="1" fontAlgn="auto" latinLnBrk="0" hangingPunct="1">
+                        <a:lnSpc>
+                          <a:spcPct val="100000"/>
+                        </a:lnSpc>
+                        <a:spcBef>
+                          <a:spcPts val="0"/>
+                        </a:spcBef>
+                        <a:spcAft>
+                          <a:spcPts val="0"/>
+                        </a:spcAft>
+                        <a:buClrTx/>
+                        <a:buSzTx/>
+                        <a:buFontTx/>
+                        <a:buNone/>
+                        <a:tabLst/>
+                        <a:defRPr/>
+                      </a:pPr>
+                      <a:r>
+                        <a:rPr lang="en-US" dirty="0"/>
+                        <a:t>VOLUME [ “/data” ]</a:t>
+                      </a:r>
+                    </a:p>
+                  </a:txBody>
+                  <a:tcPr/>
+                </a:tc>
+                <a:tc>
+                  <a:txBody>
+                    <a:bodyPr/>
+                    <a:lstStyle/>
+                    <a:p>
+                      <a:r>
+                        <a:rPr lang="en-US" dirty="0"/>
+                        <a:t>Create a mount point to share data between the host and a container or between containers (persistence!)</a:t>
+                      </a:r>
+                    </a:p>
+                  </a:txBody>
+                  <a:tcPr/>
+                </a:tc>
+                <a:extLst>
+                  <a:ext uri="{0D108BD9-81ED-4DB2-BD59-A6C34878D82A}">
+                    <a16:rowId xmlns:a16="http://schemas.microsoft.com/office/drawing/2014/main" val="630403601"/>
+                  </a:ext>
+                </a:extLst>
+              </a:tr>
+              <a:tr h="370840">
+                <a:tc>
+                  <a:txBody>
+                    <a:bodyPr/>
+                    <a:lstStyle/>
+                    <a:p>
+                      <a:pPr marL="0" marR="0" lvl="0" indent="0" algn="l" defTabSz="844083" rtl="0" eaLnBrk="1" fontAlgn="auto" latinLnBrk="0" hangingPunct="1">
+                        <a:lnSpc>
+                          <a:spcPct val="100000"/>
+                        </a:lnSpc>
+                        <a:spcBef>
+                          <a:spcPts val="0"/>
+                        </a:spcBef>
+                        <a:spcAft>
+                          <a:spcPts val="0"/>
+                        </a:spcAft>
+                        <a:buClrTx/>
+                        <a:buSzTx/>
+                        <a:buFontTx/>
+                        <a:buNone/>
+                        <a:tabLst/>
+                        <a:defRPr/>
+                      </a:pPr>
+                      <a:r>
+                        <a:rPr lang="en-US" dirty="0"/>
+                        <a:t>USER &lt;user&gt;[:group]</a:t>
+                      </a:r>
+                    </a:p>
+                  </a:txBody>
+                  <a:tcPr/>
+                </a:tc>
+                <a:tc>
+                  <a:txBody>
+                    <a:bodyPr/>
+                    <a:lstStyle/>
+                    <a:p>
+                      <a:r>
+                        <a:rPr lang="en-US" dirty="0"/>
+                        <a:t>Set the user context (and optionally the group) for all following RUN, CMD and ENTRYPOINT in the </a:t>
+                      </a:r>
+                      <a:r>
+                        <a:rPr lang="en-US" dirty="0" err="1"/>
+                        <a:t>Dockerfile</a:t>
+                      </a:r>
+                      <a:endParaRPr lang="en-US" dirty="0"/>
+                    </a:p>
+                  </a:txBody>
+                  <a:tcPr/>
+                </a:tc>
+                <a:extLst>
+                  <a:ext uri="{0D108BD9-81ED-4DB2-BD59-A6C34878D82A}">
+                    <a16:rowId xmlns:a16="http://schemas.microsoft.com/office/drawing/2014/main" val="3695873739"/>
+                  </a:ext>
+                </a:extLst>
+              </a:tr>
+              <a:tr h="370840">
+                <a:tc>
+                  <a:txBody>
+                    <a:bodyPr/>
+                    <a:lstStyle/>
+                    <a:p>
+                      <a:pPr marL="0" marR="0" lvl="0" indent="0" algn="l" defTabSz="844083" rtl="0" eaLnBrk="1" fontAlgn="auto" latinLnBrk="0" hangingPunct="1">
+                        <a:lnSpc>
+                          <a:spcPct val="100000"/>
+                        </a:lnSpc>
+                        <a:spcBef>
+                          <a:spcPts val="0"/>
+                        </a:spcBef>
+                        <a:spcAft>
+                          <a:spcPts val="0"/>
+                        </a:spcAft>
+                        <a:buClrTx/>
+                        <a:buSzTx/>
+                        <a:buFontTx/>
+                        <a:buNone/>
+                        <a:tabLst/>
+                        <a:defRPr/>
+                      </a:pPr>
+                      <a:r>
+                        <a:rPr lang="en-US" dirty="0"/>
+                        <a:t>WORKDIR /path/to/</a:t>
+                      </a:r>
+                      <a:r>
+                        <a:rPr lang="en-US" dirty="0" err="1"/>
+                        <a:t>workdir</a:t>
+                      </a:r>
+                      <a:endParaRPr lang="en-US" dirty="0"/>
+                    </a:p>
+                  </a:txBody>
+                  <a:tcPr/>
+                </a:tc>
+                <a:tc>
+                  <a:txBody>
+                    <a:bodyPr/>
+                    <a:lstStyle/>
+                    <a:p>
+                      <a:r>
+                        <a:rPr lang="en-US" dirty="0"/>
+                        <a:t>Sets the working directory for every following RUN, CMD, ENTRYPOINT, ADD or COPY command, can be used multiple times in one </a:t>
+                      </a:r>
+                      <a:r>
+                        <a:rPr lang="en-US" dirty="0" err="1"/>
+                        <a:t>Dockerfile</a:t>
+                      </a:r>
+                      <a:r>
+                        <a:rPr lang="en-US" dirty="0"/>
+                        <a:t>, the directory will be created if it does not exist, the path can also </a:t>
+                      </a:r>
+                      <a:r>
+                        <a:rPr lang="en-US"/>
+                        <a:t>be relative</a:t>
+                      </a:r>
+                      <a:endParaRPr lang="en-US" dirty="0"/>
+                    </a:p>
+                  </a:txBody>
+                  <a:tcPr/>
+                </a:tc>
+                <a:extLst>
+                  <a:ext uri="{0D108BD9-81ED-4DB2-BD59-A6C34878D82A}">
+                    <a16:rowId xmlns:a16="http://schemas.microsoft.com/office/drawing/2014/main" val="815849204"/>
+                  </a:ext>
+                </a:extLst>
+              </a:tr>
+            </a:tbl>
+          </a:graphicData>
+        </a:graphic>
+      </p:graphicFrame>
+      <p:sp>
+        <p:nvSpPr>
+          <p:cNvPr id="7" name="Textfeld 6">
+            <a:extLst>
+              <a:ext uri="{FF2B5EF4-FFF2-40B4-BE49-F238E27FC236}">
+                <a16:creationId xmlns:a16="http://schemas.microsoft.com/office/drawing/2014/main" id="{83886AA8-AD2D-42D9-9E0A-B776AE342C41}"/>
+              </a:ext>
+            </a:extLst>
+          </p:cNvPr>
+          <p:cNvSpPr txBox="1"/>
+          <p:nvPr/>
+        </p:nvSpPr>
+        <p:spPr>
+          <a:xfrm>
+            <a:off x="258763" y="5970895"/>
+            <a:ext cx="8359254" cy="369332"/>
+          </a:xfrm>
+          <a:prstGeom prst="rect">
+            <a:avLst/>
+          </a:prstGeom>
+          <a:noFill/>
+        </p:spPr>
+        <p:txBody>
+          <a:bodyPr wrap="square" rtlCol="0">
+            <a:spAutoFit/>
+          </a:bodyPr>
+          <a:lstStyle/>
+          <a:p>
+            <a:r>
+              <a:rPr lang="en-US" dirty="0"/>
+              <a:t>Quelle: https://docs.docker.com/engine/reference/builder/</a:t>
+            </a:r>
+          </a:p>
+        </p:txBody>
+      </p:sp>
+    </p:spTree>
+    <p:extLst>
+      <p:ext uri="{BB962C8B-B14F-4D97-AF65-F5344CB8AC3E}">
+        <p14:creationId xmlns:p14="http://schemas.microsoft.com/office/powerpoint/2010/main" val="3922777106"/>
       </p:ext>
     </p:extLst>
   </p:cSld>
@@ -9294,4 +11476,18 @@
     </a:ext>
   </a:extLst>
 </a:theme>
+</file>
+
+<file path=ppt/webextensions/webextension1.xml><?xml version="1.0" encoding="utf-8"?>
+<we:webextension xmlns:we="http://schemas.microsoft.com/office/webextensions/webextension/2010/11" id="{C7503F24-31A4-44F9-8697-76BB9F70E0F7}">
+  <we:reference id="wa104379263" version="1.0.0.1" store="de-DE" storeType="OMEX"/>
+  <we:alternateReferences>
+    <we:reference id="wa104379263" version="1.0.0.1" store="wa104379263" storeType="OMEX"/>
+  </we:alternateReferences>
+  <we:properties>
+    <we:property name="config" value="{&quot;display_lang&quot;:&quot;en&quot;,&quot;display_font&quot;:&quot;Consolas&quot;,&quot;syntax_color&quot;:{&quot;Reserved words&quot;:&quot;#0000ff&quot;,&quot;Modules,Classes,Exceptions&quot;:&quot;#FF0000&quot;,&quot;Methods&quot;:&quot;#008080&quot;,&quot;Attributes&quot;:&quot;#808000&quot;,&quot;Line comment&quot;:&quot;#008000&quot;,&quot;Block comment&quot;:&quot;#008000&quot;,&quot;Block comment 2&quot;:&quot;#008000&quot;,&quot;Quotation&quot;:&quot;#FF00FF&quot;,&quot;Quotation 2&quot;:&quot;#FF00FF&quot;,&quot;Number&quot;:&quot;#800080&quot;},&quot;old_syntax_color&quot;:{&quot;Reserved words&quot;:&quot;#0000FF&quot;,&quot;Modules,Classes,Exceptions&quot;:&quot;#FF0000&quot;,&quot;Methods&quot;:&quot;#008080&quot;,&quot;Attributes&quot;:&quot;#808000&quot;,&quot;Line comment&quot;:&quot;#008000&quot;,&quot;Block comment&quot;:&quot;#008000&quot;,&quot;Block comment 2&quot;:&quot;#008000&quot;,&quot;Quotation&quot;:&quot;#FF00FF&quot;,&quot;Quotation 2&quot;:&quot;#FF00FF&quot;,&quot;Number&quot;:&quot;#800080&quot;},&quot;show_line_number&quot;:true,&quot;code_lang&quot;:&quot;py&quot;,&quot;code&quot;:&quot;FROM beakerx-base:latest\n\nMAINTAINER BeakerX Feedback &lt;beakerx-feedback@twosigma.com&gt;\n\nENV SHELL /bin/bash\nENV NB_UID 1000\nENV HOME /home/$NB_USER\n\nCOPY docker/setup.sh /home/beakerx\nCOPY docker/start.sh /usr/local/bin/\nCOPY docker/start-notebook.sh /usr/local/bin/\nCOPY docker/start-singleuser.sh /usr/local/bin/\nCOPY docker/jupyter_notebook_config.py /etc/jupyter/\n\nCOPY / $HOME\n\nRUN chown -R beakerx:beakerx /home/beakerx\n\nUSER $NB_USER\nWORKDIR $HOME\n\nRUN /home/beakerx/setup.sh\n\nEXPOSE 8888\n\nCMD [\&quot;start-notebook.sh\&quot;]&quot;,&quot;ctags&quot;:{}}"/>
+  </we:properties>
+  <we:bindings/>
+  <we:snapshot xmlns:r="http://schemas.openxmlformats.org/officeDocument/2006/relationships" r:embed="rId1"/>
+</we:webextension>
 </file>
</xml_diff>

<commit_message>
final version of docker slides
</commit_message>
<xml_diff>
--- a/02-Container-and-Provisioning/ContainerProvisioning.pptx
+++ b/02-Container-and-Provisioning/ContainerProvisioning.pptx
@@ -5,7 +5,7 @@
     <p:sldMasterId id="2147483672" r:id="rId1"/>
   </p:sldMasterIdLst>
   <p:notesMasterIdLst>
-    <p:notesMasterId r:id="rId20"/>
+    <p:notesMasterId r:id="rId24"/>
   </p:notesMasterIdLst>
   <p:sldIdLst>
     <p:sldId id="256" r:id="rId2"/>
@@ -26,6 +26,10 @@
     <p:sldId id="273" r:id="rId17"/>
     <p:sldId id="274" r:id="rId18"/>
     <p:sldId id="275" r:id="rId19"/>
+    <p:sldId id="276" r:id="rId20"/>
+    <p:sldId id="277" r:id="rId21"/>
+    <p:sldId id="279" r:id="rId22"/>
+    <p:sldId id="278" r:id="rId23"/>
   </p:sldIdLst>
   <p:sldSz cx="9144000" cy="6858000" type="screen4x3"/>
   <p:notesSz cx="6858000" cy="9144000"/>
@@ -147,6 +151,10 @@
             <p14:sldId id="273"/>
             <p14:sldId id="274"/>
             <p14:sldId id="275"/>
+            <p14:sldId id="276"/>
+            <p14:sldId id="277"/>
+            <p14:sldId id="279"/>
+            <p14:sldId id="278"/>
           </p14:sldIdLst>
         </p14:section>
       </p14:sectionLst>
@@ -2947,7 +2955,7 @@
           <a:p>
             <a:r>
               <a:rPr lang="de-DE" dirty="0"/>
-              <a:t>Docker CLI - Basics</a:t>
+              <a:t>Docker CLI – Basics</a:t>
             </a:r>
             <a:endParaRPr lang="en-US" dirty="0"/>
           </a:p>
@@ -3493,9 +3501,10 @@
           <a:lstStyle/>
           <a:p>
             <a:r>
-              <a:rPr lang="en-US" dirty="0"/>
-              <a:t>Docker CLI</a:t>
-            </a:r>
+              <a:rPr lang="de-DE" dirty="0"/>
+              <a:t>Docker CLI – Basics</a:t>
+            </a:r>
+            <a:endParaRPr lang="en-US" dirty="0"/>
           </a:p>
         </p:txBody>
       </p:sp>
@@ -5350,7 +5359,10 @@
               <a:rPr lang="en-US" dirty="0" err="1"/>
               <a:t>Dockerfile</a:t>
             </a:r>
-            <a:endParaRPr lang="en-US" dirty="0"/>
+            <a:r>
+              <a:rPr lang="en-US" dirty="0"/>
+              <a:t> – Basics</a:t>
+            </a:r>
           </a:p>
         </p:txBody>
       </p:sp>
@@ -5828,7 +5840,10 @@
               <a:rPr lang="en-US" dirty="0" err="1"/>
               <a:t>Dockerfile</a:t>
             </a:r>
-            <a:endParaRPr lang="en-US" dirty="0"/>
+            <a:r>
+              <a:rPr lang="en-US" dirty="0"/>
+              <a:t> – Basics</a:t>
+            </a:r>
           </a:p>
         </p:txBody>
       </p:sp>
@@ -6137,6 +6152,113 @@
 </p:sld>
 </file>
 
+<file path=ppt/slides/slide19.xml><?xml version="1.0" encoding="utf-8"?>
+<p:sld xmlns:a="http://schemas.openxmlformats.org/drawingml/2006/main" xmlns:r="http://schemas.openxmlformats.org/officeDocument/2006/relationships" xmlns:p="http://schemas.openxmlformats.org/presentationml/2006/main">
+  <p:cSld>
+    <p:spTree>
+      <p:nvGrpSpPr>
+        <p:cNvPr id="1" name=""/>
+        <p:cNvGrpSpPr/>
+        <p:nvPr/>
+      </p:nvGrpSpPr>
+      <p:grpSpPr>
+        <a:xfrm>
+          <a:off x="0" y="0"/>
+          <a:ext cx="0" cy="0"/>
+          <a:chOff x="0" y="0"/>
+          <a:chExt cx="0" cy="0"/>
+        </a:xfrm>
+      </p:grpSpPr>
+      <p:sp>
+        <p:nvSpPr>
+          <p:cNvPr id="4" name="Titel 3">
+            <a:extLst>
+              <a:ext uri="{FF2B5EF4-FFF2-40B4-BE49-F238E27FC236}">
+                <a16:creationId xmlns:a16="http://schemas.microsoft.com/office/drawing/2014/main" id="{A2F044AE-3CD7-412D-9F46-1AB8286BDC5F}"/>
+              </a:ext>
+            </a:extLst>
+          </p:cNvPr>
+          <p:cNvSpPr>
+            <a:spLocks noGrp="1"/>
+          </p:cNvSpPr>
+          <p:nvPr>
+            <p:ph type="title"/>
+          </p:nvPr>
+        </p:nvSpPr>
+        <p:spPr/>
+        <p:txBody>
+          <a:bodyPr/>
+          <a:lstStyle/>
+          <a:p>
+            <a:r>
+              <a:rPr lang="en-US" dirty="0"/>
+              <a:t>Docker-Compose</a:t>
+            </a:r>
+          </a:p>
+        </p:txBody>
+      </p:sp>
+      <p:pic>
+        <p:nvPicPr>
+          <p:cNvPr id="1026" name="Picture 2" descr="https://www.baptiste-donaux.fr/tutoriel-symfony-docker-compose-v2/cover.png">
+            <a:extLst>
+              <a:ext uri="{FF2B5EF4-FFF2-40B4-BE49-F238E27FC236}">
+                <a16:creationId xmlns:a16="http://schemas.microsoft.com/office/drawing/2014/main" id="{3FF6CC7F-E191-4A89-9FA3-4F1515BCEA8C}"/>
+              </a:ext>
+            </a:extLst>
+          </p:cNvPr>
+          <p:cNvPicPr>
+            <a:picLocks noGrp="1" noChangeAspect="1" noChangeArrowheads="1"/>
+          </p:cNvPicPr>
+          <p:nvPr>
+            <p:ph idx="1"/>
+          </p:nvPr>
+        </p:nvPicPr>
+        <p:blipFill>
+          <a:blip r:embed="rId2">
+            <a:extLst>
+              <a:ext uri="{28A0092B-C50C-407E-A947-70E740481C1C}">
+                <a14:useLocalDpi xmlns:a14="http://schemas.microsoft.com/office/drawing/2010/main" val="0"/>
+              </a:ext>
+            </a:extLst>
+          </a:blip>
+          <a:srcRect/>
+          <a:stretch>
+            <a:fillRect/>
+          </a:stretch>
+        </p:blipFill>
+        <p:spPr bwMode="auto">
+          <a:xfrm>
+            <a:off x="2086799" y="1549021"/>
+            <a:ext cx="4464024" cy="4395751"/>
+          </a:xfrm>
+          <a:prstGeom prst="rect">
+            <a:avLst/>
+          </a:prstGeom>
+          <a:noFill/>
+          <a:extLst>
+            <a:ext uri="{909E8E84-426E-40DD-AFC4-6F175D3DCCD1}">
+              <a14:hiddenFill xmlns:a14="http://schemas.microsoft.com/office/drawing/2010/main">
+                <a:solidFill>
+                  <a:srgbClr val="FFFFFF"/>
+                </a:solidFill>
+              </a14:hiddenFill>
+            </a:ext>
+          </a:extLst>
+        </p:spPr>
+      </p:pic>
+    </p:spTree>
+    <p:extLst>
+      <p:ext uri="{BB962C8B-B14F-4D97-AF65-F5344CB8AC3E}">
+        <p14:creationId xmlns:p14="http://schemas.microsoft.com/office/powerpoint/2010/main" val="683329068"/>
+      </p:ext>
+    </p:extLst>
+  </p:cSld>
+  <p:clrMapOvr>
+    <a:masterClrMapping/>
+  </p:clrMapOvr>
+</p:sld>
+</file>
+
 <file path=ppt/slides/slide2.xml><?xml version="1.0" encoding="utf-8"?>
 <p:sld xmlns:a="http://schemas.openxmlformats.org/drawingml/2006/main" xmlns:r="http://schemas.openxmlformats.org/officeDocument/2006/relationships" xmlns:p="http://schemas.openxmlformats.org/presentationml/2006/main">
   <p:cSld>
@@ -6280,6 +6402,525 @@
     <p:extLst>
       <p:ext uri="{BB962C8B-B14F-4D97-AF65-F5344CB8AC3E}">
         <p14:creationId xmlns:p14="http://schemas.microsoft.com/office/powerpoint/2010/main" val="1328062920"/>
+      </p:ext>
+    </p:extLst>
+  </p:cSld>
+  <p:clrMapOvr>
+    <a:masterClrMapping/>
+  </p:clrMapOvr>
+</p:sld>
+</file>
+
+<file path=ppt/slides/slide20.xml><?xml version="1.0" encoding="utf-8"?>
+<p:sld xmlns:a="http://schemas.openxmlformats.org/drawingml/2006/main" xmlns:r="http://schemas.openxmlformats.org/officeDocument/2006/relationships" xmlns:p="http://schemas.openxmlformats.org/presentationml/2006/main">
+  <p:cSld>
+    <p:spTree>
+      <p:nvGrpSpPr>
+        <p:cNvPr id="1" name=""/>
+        <p:cNvGrpSpPr/>
+        <p:nvPr/>
+      </p:nvGrpSpPr>
+      <p:grpSpPr>
+        <a:xfrm>
+          <a:off x="0" y="0"/>
+          <a:ext cx="0" cy="0"/>
+          <a:chOff x="0" y="0"/>
+          <a:chExt cx="0" cy="0"/>
+        </a:xfrm>
+      </p:grpSpPr>
+      <p:sp>
+        <p:nvSpPr>
+          <p:cNvPr id="4" name="Titel 3">
+            <a:extLst>
+              <a:ext uri="{FF2B5EF4-FFF2-40B4-BE49-F238E27FC236}">
+                <a16:creationId xmlns:a16="http://schemas.microsoft.com/office/drawing/2014/main" id="{64816E36-ECC9-49EF-8274-EFFF15E4958C}"/>
+              </a:ext>
+            </a:extLst>
+          </p:cNvPr>
+          <p:cNvSpPr>
+            <a:spLocks noGrp="1"/>
+          </p:cNvSpPr>
+          <p:nvPr>
+            <p:ph type="title"/>
+          </p:nvPr>
+        </p:nvSpPr>
+        <p:spPr/>
+        <p:txBody>
+          <a:bodyPr/>
+          <a:lstStyle/>
+          <a:p>
+            <a:r>
+              <a:rPr lang="en-US" dirty="0"/>
+              <a:t>Docker-Compose</a:t>
+            </a:r>
+          </a:p>
+        </p:txBody>
+      </p:sp>
+      <p:pic>
+        <p:nvPicPr>
+          <p:cNvPr id="2050" name="Picture 2" descr="Schéma des conteneurs">
+            <a:extLst>
+              <a:ext uri="{FF2B5EF4-FFF2-40B4-BE49-F238E27FC236}">
+                <a16:creationId xmlns:a16="http://schemas.microsoft.com/office/drawing/2014/main" id="{3C6C378E-69E1-46E2-9BC9-D271AB12CE88}"/>
+              </a:ext>
+            </a:extLst>
+          </p:cNvPr>
+          <p:cNvPicPr>
+            <a:picLocks noGrp="1" noChangeAspect="1" noChangeArrowheads="1"/>
+          </p:cNvPicPr>
+          <p:nvPr>
+            <p:ph idx="1"/>
+          </p:nvPr>
+        </p:nvPicPr>
+        <p:blipFill>
+          <a:blip r:embed="rId2">
+            <a:extLst>
+              <a:ext uri="{28A0092B-C50C-407E-A947-70E740481C1C}">
+                <a14:useLocalDpi xmlns:a14="http://schemas.microsoft.com/office/drawing/2010/main" val="0"/>
+              </a:ext>
+            </a:extLst>
+          </a:blip>
+          <a:srcRect/>
+          <a:stretch>
+            <a:fillRect/>
+          </a:stretch>
+        </p:blipFill>
+        <p:spPr bwMode="auto">
+          <a:xfrm>
+            <a:off x="258763" y="1898716"/>
+            <a:ext cx="8697912" cy="3855905"/>
+          </a:xfrm>
+          <a:prstGeom prst="rect">
+            <a:avLst/>
+          </a:prstGeom>
+          <a:noFill/>
+          <a:extLst>
+            <a:ext uri="{909E8E84-426E-40DD-AFC4-6F175D3DCCD1}">
+              <a14:hiddenFill xmlns:a14="http://schemas.microsoft.com/office/drawing/2010/main">
+                <a:solidFill>
+                  <a:srgbClr val="FFFFFF"/>
+                </a:solidFill>
+              </a14:hiddenFill>
+            </a:ext>
+          </a:extLst>
+        </p:spPr>
+      </p:pic>
+      <p:sp>
+        <p:nvSpPr>
+          <p:cNvPr id="6" name="Textfeld 5">
+            <a:extLst>
+              <a:ext uri="{FF2B5EF4-FFF2-40B4-BE49-F238E27FC236}">
+                <a16:creationId xmlns:a16="http://schemas.microsoft.com/office/drawing/2014/main" id="{33673F1E-5A2F-4F6E-B36C-0A7371E0D142}"/>
+              </a:ext>
+            </a:extLst>
+          </p:cNvPr>
+          <p:cNvSpPr txBox="1"/>
+          <p:nvPr/>
+        </p:nvSpPr>
+        <p:spPr>
+          <a:xfrm>
+            <a:off x="258763" y="6066851"/>
+            <a:ext cx="8413845" cy="369332"/>
+          </a:xfrm>
+          <a:prstGeom prst="rect">
+            <a:avLst/>
+          </a:prstGeom>
+          <a:noFill/>
+        </p:spPr>
+        <p:txBody>
+          <a:bodyPr wrap="square" rtlCol="0">
+            <a:spAutoFit/>
+          </a:bodyPr>
+          <a:lstStyle/>
+          <a:p>
+            <a:r>
+              <a:rPr lang="en-US" dirty="0">
+                <a:hlinkClick r:id="rId3"/>
+              </a:rPr>
+              <a:t>Quelle</a:t>
+            </a:r>
+            <a:endParaRPr lang="en-US" dirty="0"/>
+          </a:p>
+        </p:txBody>
+      </p:sp>
+    </p:spTree>
+    <p:extLst>
+      <p:ext uri="{BB962C8B-B14F-4D97-AF65-F5344CB8AC3E}">
+        <p14:creationId xmlns:p14="http://schemas.microsoft.com/office/powerpoint/2010/main" val="3363554341"/>
+      </p:ext>
+    </p:extLst>
+  </p:cSld>
+  <p:clrMapOvr>
+    <a:masterClrMapping/>
+  </p:clrMapOvr>
+</p:sld>
+</file>
+
+<file path=ppt/slides/slide21.xml><?xml version="1.0" encoding="utf-8"?>
+<p:sld xmlns:a="http://schemas.openxmlformats.org/drawingml/2006/main" xmlns:r="http://schemas.openxmlformats.org/officeDocument/2006/relationships" xmlns:p="http://schemas.openxmlformats.org/presentationml/2006/main">
+  <p:cSld>
+    <p:spTree>
+      <p:nvGrpSpPr>
+        <p:cNvPr id="1" name=""/>
+        <p:cNvGrpSpPr/>
+        <p:nvPr/>
+      </p:nvGrpSpPr>
+      <p:grpSpPr>
+        <a:xfrm>
+          <a:off x="0" y="0"/>
+          <a:ext cx="0" cy="0"/>
+          <a:chOff x="0" y="0"/>
+          <a:chExt cx="0" cy="0"/>
+        </a:xfrm>
+      </p:grpSpPr>
+      <p:sp>
+        <p:nvSpPr>
+          <p:cNvPr id="4" name="Titel 3">
+            <a:extLst>
+              <a:ext uri="{FF2B5EF4-FFF2-40B4-BE49-F238E27FC236}">
+                <a16:creationId xmlns:a16="http://schemas.microsoft.com/office/drawing/2014/main" id="{57C7E06E-1C11-4749-A4F6-4E775151A273}"/>
+              </a:ext>
+            </a:extLst>
+          </p:cNvPr>
+          <p:cNvSpPr>
+            <a:spLocks noGrp="1"/>
+          </p:cNvSpPr>
+          <p:nvPr>
+            <p:ph type="title"/>
+          </p:nvPr>
+        </p:nvSpPr>
+        <p:spPr/>
+        <p:txBody>
+          <a:bodyPr/>
+          <a:lstStyle/>
+          <a:p>
+            <a:r>
+              <a:rPr lang="en-US" dirty="0"/>
+              <a:t>Docker-Compose</a:t>
+            </a:r>
+          </a:p>
+        </p:txBody>
+      </p:sp>
+      <p:sp>
+        <p:nvSpPr>
+          <p:cNvPr id="5" name="Inhaltsplatzhalter 4">
+            <a:extLst>
+              <a:ext uri="{FF2B5EF4-FFF2-40B4-BE49-F238E27FC236}">
+                <a16:creationId xmlns:a16="http://schemas.microsoft.com/office/drawing/2014/main" id="{8E464DB5-4E8A-41DD-85E4-E4A30E1C3A8C}"/>
+              </a:ext>
+            </a:extLst>
+          </p:cNvPr>
+          <p:cNvSpPr>
+            <a:spLocks noGrp="1"/>
+          </p:cNvSpPr>
+          <p:nvPr>
+            <p:ph idx="1"/>
+          </p:nvPr>
+        </p:nvSpPr>
+        <p:spPr/>
+        <p:txBody>
+          <a:bodyPr/>
+          <a:lstStyle/>
+          <a:p>
+            <a:r>
+              <a:rPr lang="en-US" dirty="0"/>
+              <a:t>Tool to create multi-container applications</a:t>
+            </a:r>
+          </a:p>
+          <a:p>
+            <a:r>
+              <a:rPr lang="en-US" dirty="0"/>
+              <a:t>Define all </a:t>
+            </a:r>
+            <a:r>
+              <a:rPr lang="en-US" i="1" dirty="0"/>
+              <a:t>services</a:t>
+            </a:r>
+            <a:r>
+              <a:rPr lang="en-US" dirty="0"/>
+              <a:t> the application consists of</a:t>
+            </a:r>
+          </a:p>
+          <a:p>
+            <a:r>
+              <a:rPr lang="en-US" dirty="0"/>
+              <a:t>Separate </a:t>
+            </a:r>
+            <a:r>
+              <a:rPr lang="en-US" i="1" dirty="0"/>
+              <a:t>services</a:t>
+            </a:r>
+            <a:r>
+              <a:rPr lang="en-US" dirty="0"/>
+              <a:t> optionally in multiple </a:t>
+            </a:r>
+            <a:r>
+              <a:rPr lang="en-US" i="1" dirty="0"/>
+              <a:t>networks</a:t>
+            </a:r>
+            <a:endParaRPr lang="en-US" dirty="0"/>
+          </a:p>
+          <a:p>
+            <a:r>
+              <a:rPr lang="en-US" dirty="0"/>
+              <a:t>Configure </a:t>
+            </a:r>
+            <a:r>
+              <a:rPr lang="en-US" i="1" dirty="0"/>
+              <a:t>services</a:t>
+            </a:r>
+            <a:r>
+              <a:rPr lang="en-US" dirty="0"/>
+              <a:t> (set environment variables, expose ports, mount volumes and so on)</a:t>
+            </a:r>
+          </a:p>
+          <a:p>
+            <a:r>
+              <a:rPr lang="en-US" dirty="0"/>
+              <a:t>Start and stop a multi-container application by running a single command (docker-compose up/down)</a:t>
+            </a:r>
+          </a:p>
+          <a:p>
+            <a:r>
+              <a:rPr lang="en-US" dirty="0"/>
+              <a:t>An extended version is used to deploy multi-container applications to Docker Swarm</a:t>
+            </a:r>
+          </a:p>
+          <a:p>
+            <a:r>
+              <a:rPr lang="de-DE" dirty="0"/>
+              <a:t>Other Docker </a:t>
+            </a:r>
+            <a:r>
+              <a:rPr lang="de-DE" dirty="0" err="1"/>
+              <a:t>cluster</a:t>
+            </a:r>
+            <a:r>
+              <a:rPr lang="de-DE" dirty="0"/>
+              <a:t> </a:t>
+            </a:r>
+            <a:r>
+              <a:rPr lang="de-DE" dirty="0" err="1"/>
+              <a:t>systems</a:t>
+            </a:r>
+            <a:r>
+              <a:rPr lang="de-DE" dirty="0"/>
+              <a:t> </a:t>
+            </a:r>
+            <a:r>
+              <a:rPr lang="de-DE" dirty="0" err="1"/>
+              <a:t>use</a:t>
+            </a:r>
+            <a:r>
+              <a:rPr lang="de-DE" dirty="0"/>
+              <a:t> </a:t>
+            </a:r>
+            <a:r>
+              <a:rPr lang="de-DE" dirty="0" err="1"/>
+              <a:t>similar</a:t>
+            </a:r>
+            <a:r>
+              <a:rPr lang="de-DE" dirty="0"/>
+              <a:t> </a:t>
+            </a:r>
+            <a:r>
+              <a:rPr lang="de-DE" dirty="0" err="1"/>
+              <a:t>formats</a:t>
+            </a:r>
+            <a:r>
+              <a:rPr lang="de-DE" dirty="0"/>
+              <a:t> (e.g. </a:t>
+            </a:r>
+            <a:r>
+              <a:rPr lang="de-DE" dirty="0" err="1"/>
+              <a:t>Pod</a:t>
+            </a:r>
+            <a:r>
+              <a:rPr lang="de-DE" dirty="0"/>
+              <a:t> </a:t>
+            </a:r>
+            <a:r>
+              <a:rPr lang="de-DE" dirty="0" err="1"/>
+              <a:t>definition</a:t>
+            </a:r>
+            <a:r>
+              <a:rPr lang="de-DE" dirty="0"/>
+              <a:t> in </a:t>
+            </a:r>
+            <a:r>
+              <a:rPr lang="de-DE" dirty="0" err="1"/>
+              <a:t>Kubernetes</a:t>
+            </a:r>
+            <a:r>
+              <a:rPr lang="de-DE" dirty="0"/>
+              <a:t>)</a:t>
+            </a:r>
+          </a:p>
+          <a:p>
+            <a:r>
+              <a:rPr lang="de-DE" dirty="0" err="1"/>
+              <a:t>Docs</a:t>
+            </a:r>
+            <a:r>
+              <a:rPr lang="de-DE" dirty="0"/>
+              <a:t>: </a:t>
+            </a:r>
+            <a:r>
+              <a:rPr lang="de-DE" dirty="0">
+                <a:hlinkClick r:id="rId2"/>
+              </a:rPr>
+              <a:t>https://docs.docker.com/compose/compose-file/compose-file-v2/</a:t>
+            </a:r>
+            <a:endParaRPr lang="de-DE" dirty="0"/>
+          </a:p>
+          <a:p>
+            <a:r>
+              <a:rPr lang="de-DE" dirty="0" err="1"/>
+              <a:t>Cheatsheet</a:t>
+            </a:r>
+            <a:r>
+              <a:rPr lang="de-DE" dirty="0"/>
+              <a:t>: </a:t>
+            </a:r>
+            <a:r>
+              <a:rPr lang="de-DE" dirty="0">
+                <a:hlinkClick r:id="rId3"/>
+              </a:rPr>
+              <a:t>https://devhints.io/docker-compose</a:t>
+            </a:r>
+            <a:endParaRPr lang="de-DE" dirty="0"/>
+          </a:p>
+        </p:txBody>
+      </p:sp>
+    </p:spTree>
+    <p:extLst>
+      <p:ext uri="{BB962C8B-B14F-4D97-AF65-F5344CB8AC3E}">
+        <p14:creationId xmlns:p14="http://schemas.microsoft.com/office/powerpoint/2010/main" val="1165912547"/>
+      </p:ext>
+    </p:extLst>
+  </p:cSld>
+  <p:clrMapOvr>
+    <a:masterClrMapping/>
+  </p:clrMapOvr>
+</p:sld>
+</file>
+
+<file path=ppt/slides/slide22.xml><?xml version="1.0" encoding="utf-8"?>
+<p:sld xmlns:a="http://schemas.openxmlformats.org/drawingml/2006/main" xmlns:r="http://schemas.openxmlformats.org/officeDocument/2006/relationships" xmlns:p="http://schemas.openxmlformats.org/presentationml/2006/main">
+  <p:cSld>
+    <p:spTree>
+      <p:nvGrpSpPr>
+        <p:cNvPr id="1" name=""/>
+        <p:cNvGrpSpPr/>
+        <p:nvPr/>
+      </p:nvGrpSpPr>
+      <p:grpSpPr>
+        <a:xfrm>
+          <a:off x="0" y="0"/>
+          <a:ext cx="0" cy="0"/>
+          <a:chOff x="0" y="0"/>
+          <a:chExt cx="0" cy="0"/>
+        </a:xfrm>
+      </p:grpSpPr>
+      <p:sp>
+        <p:nvSpPr>
+          <p:cNvPr id="4" name="Titel 3">
+            <a:extLst>
+              <a:ext uri="{FF2B5EF4-FFF2-40B4-BE49-F238E27FC236}">
+                <a16:creationId xmlns:a16="http://schemas.microsoft.com/office/drawing/2014/main" id="{C6A112DF-183C-4292-8D81-B225193DC97A}"/>
+              </a:ext>
+            </a:extLst>
+          </p:cNvPr>
+          <p:cNvSpPr>
+            <a:spLocks noGrp="1"/>
+          </p:cNvSpPr>
+          <p:nvPr>
+            <p:ph type="title"/>
+          </p:nvPr>
+        </p:nvSpPr>
+        <p:spPr/>
+        <p:txBody>
+          <a:bodyPr/>
+          <a:lstStyle/>
+          <a:p>
+            <a:r>
+              <a:rPr lang="en-US" dirty="0"/>
+              <a:t>Docker-Compose – Example </a:t>
+            </a:r>
+            <a:r>
+              <a:rPr lang="en-US" dirty="0" err="1"/>
+              <a:t>Symfony</a:t>
+            </a:r>
+            <a:endParaRPr lang="en-US" dirty="0"/>
+          </a:p>
+        </p:txBody>
+      </p:sp>
+      <mc:AlternateContent xmlns:mc="http://schemas.openxmlformats.org/markup-compatibility/2006">
+        <mc:Choice xmlns:we="http://schemas.microsoft.com/office/webextensions/webextension/2010/11" xmlns:pca="http://schemas.microsoft.com/office/powerpoint/2013/contentapp" Requires="we pca">
+          <p:graphicFrame>
+            <p:nvGraphicFramePr>
+              <p:cNvPr id="6" name="Inhaltsplatzhalter 5" title="Code Presenter Pro">
+                <a:extLst>
+                  <a:ext uri="{FF2B5EF4-FFF2-40B4-BE49-F238E27FC236}">
+                    <a16:creationId xmlns:a16="http://schemas.microsoft.com/office/drawing/2014/main" id="{D337641E-FA97-464A-B62B-9A71EB2C26BA}"/>
+                  </a:ext>
+                </a:extLst>
+              </p:cNvPr>
+              <p:cNvGraphicFramePr>
+                <a:graphicFrameLocks noGrp="1"/>
+              </p:cNvGraphicFramePr>
+              <p:nvPr>
+                <p:ph idx="1"/>
+              </p:nvPr>
+            </p:nvGraphicFramePr>
+            <p:xfrm>
+              <a:off x="258763" y="1403350"/>
+              <a:ext cx="8697912" cy="4846638"/>
+            </p:xfrm>
+            <a:graphic>
+              <a:graphicData uri="http://schemas.microsoft.com/office/webextensions/webextension/2010/11">
+                <we:webextensionref xmlns:we="http://schemas.microsoft.com/office/webextensions/webextension/2010/11" xmlns:r="http://schemas.openxmlformats.org/officeDocument/2006/relationships" r:id="rId2"/>
+              </a:graphicData>
+            </a:graphic>
+          </p:graphicFrame>
+        </mc:Choice>
+        <mc:Fallback>
+          <p:pic>
+            <p:nvPicPr>
+              <p:cNvPr id="6" name="Inhaltsplatzhalter 5" title="Code Presenter Pro">
+                <a:extLst>
+                  <a:ext uri="{FF2B5EF4-FFF2-40B4-BE49-F238E27FC236}">
+                    <a16:creationId xmlns:a16="http://schemas.microsoft.com/office/drawing/2014/main" id="{D337641E-FA97-464A-B62B-9A71EB2C26BA}"/>
+                  </a:ext>
+                </a:extLst>
+              </p:cNvPr>
+              <p:cNvPicPr>
+                <a:picLocks noGrp="1" noRot="1" noChangeAspect="1" noMove="1" noResize="1" noEditPoints="1" noAdjustHandles="1" noChangeArrowheads="1" noChangeShapeType="1"/>
+              </p:cNvPicPr>
+              <p:nvPr/>
+            </p:nvPicPr>
+            <p:blipFill>
+              <a:blip r:embed="rId3"/>
+              <a:stretch>
+                <a:fillRect/>
+              </a:stretch>
+            </p:blipFill>
+            <p:spPr>
+              <a:xfrm>
+                <a:off x="258763" y="1403350"/>
+                <a:ext cx="8697912" cy="4846638"/>
+              </a:xfrm>
+              <a:prstGeom prst="rect">
+                <a:avLst/>
+              </a:prstGeom>
+            </p:spPr>
+          </p:pic>
+        </mc:Fallback>
+      </mc:AlternateContent>
+    </p:spTree>
+    <p:extLst>
+      <p:ext uri="{BB962C8B-B14F-4D97-AF65-F5344CB8AC3E}">
+        <p14:creationId xmlns:p14="http://schemas.microsoft.com/office/powerpoint/2010/main" val="89454346"/>
       </p:ext>
     </p:extLst>
   </p:cSld>
@@ -11490,4 +12131,18 @@
   <we:bindings/>
   <we:snapshot xmlns:r="http://schemas.openxmlformats.org/officeDocument/2006/relationships" r:embed="rId1"/>
 </we:webextension>
+</file>
+
+<file path=ppt/webextensions/webextension2.xml><?xml version="1.0" encoding="utf-8"?>
+<we:webextension xmlns:we="http://schemas.microsoft.com/office/webextensions/webextension/2010/11" id="{2A264BF3-3A84-484B-8EF3-F3C756A4FAC9}">
+  <we:reference id="wa104379263" version="1.0.0.1" store="de-DE" storeType="OMEX"/>
+  <we:alternateReferences>
+    <we:reference id="wa104379263" version="1.0.0.1" store="wa104379263" storeType="OMEX"/>
+  </we:alternateReferences>
+  <we:properties>
+    <we:property name="config" value="{&quot;display_lang&quot;:&quot;en&quot;,&quot;display_font&quot;:&quot;Consolas&quot;,&quot;syntax_color&quot;:{&quot;Reserved words&quot;:&quot;#0000ff&quot;,&quot;Built-in objects&quot;:&quot;#FF0000&quot;,&quot;Line comment&quot;:&quot;#008000&quot;,&quot;Block comment&quot;:&quot;#008000&quot;,&quot;Quotation&quot;:&quot;#FF00FF&quot;,&quot;Quotation 2&quot;:&quot;#FF00FF&quot;,&quot;Number&quot;:&quot;#800080&quot;},&quot;old_syntax_color&quot;:{&quot;Reserved words&quot;:&quot;#0000FF&quot;,&quot;Built-in objects&quot;:&quot;#FF0000&quot;,&quot;Line comment&quot;:&quot;#008000&quot;,&quot;Block comment&quot;:&quot;#008000&quot;,&quot;Quotation&quot;:&quot;#FF00FF&quot;,&quot;Quotation 2&quot;:&quot;#FF00FF&quot;,&quot;Number&quot;:&quot;#800080&quot;},&quot;show_line_number&quot;:true,&quot;code_lang&quot;:&quot;js&quot;,&quot;code&quot;:&quot;application:\n    image: symfony/code\n    volumes:\n        - symfony:/var/www/symfony\n        - logs/symfony:/var/www/symfony/app/logs\n    tty: true\ndb:\n    image: mysql\n    ports:\n        - 3306:3306\n    environment:\n        MYSQL_ROOT_PASSWORD: root\n        MYSQL_DATABASE: symfony\n        MYSQL_USER: root\n        MYSQL_PASSWORD: root\nphp:\n    image: symfony/php-fpm\n    expose:\n        - 9000:9000\n    volumes_from:\n        - application\n    links:\n        - db\nnginx:\n    image: symfony/nginx\n    ports:\n        - 80:80\n    links:\n        - php\n    volumes_from:\n        - application\n    volumes:\n        - logs/nginx/:/var/log/nginx&quot;,&quot;ctags&quot;:{}}"/>
+  </we:properties>
+  <we:bindings/>
+  <we:snapshot xmlns:r="http://schemas.openxmlformats.org/officeDocument/2006/relationships" r:embed="rId1"/>
+</we:webextension>
 </file>
</xml_diff>